<commit_message>
added final exam location
</commit_message>
<xml_diff>
--- a/assets/ppt/codegen/ssaform1.pptx
+++ b/assets/ppt/codegen/ssaform1.pptx
@@ -2,7 +2,7 @@
 <file path=ppt/presentation.xml><?xml version="1.0" encoding="utf-8"?>
 <p:presentation xmlns:a="http://schemas.openxmlformats.org/drawingml/2006/main" xmlns:r="http://schemas.openxmlformats.org/officeDocument/2006/relationships" xmlns:p="http://schemas.openxmlformats.org/presentationml/2006/main" strictFirstAndLastChars="0" saveSubsetFonts="1" autoCompressPictures="0">
   <p:sldMasterIdLst>
-    <p:sldMasterId id="2147483648" r:id="rId1"/>
+    <p:sldMasterId id="2147483660" r:id="rId1"/>
   </p:sldMasterIdLst>
   <p:notesMasterIdLst>
     <p:notesMasterId r:id="rId10"/>
@@ -147,6 +147,22 @@
       </a:defRPr>
     </a:lvl9pPr>
   </p:defaultTextStyle>
+  <p:extLst>
+    <p:ext uri="{EFAFB233-063F-42B5-8137-9DF3F51BA10A}">
+      <p15:sldGuideLst xmlns:p15="http://schemas.microsoft.com/office/powerpoint/2012/main">
+        <p15:guide id="1" orient="horz" pos="2160">
+          <p15:clr>
+            <a:srgbClr val="A4A3A4"/>
+          </p15:clr>
+        </p15:guide>
+        <p15:guide id="2" pos="2880">
+          <p15:clr>
+            <a:srgbClr val="A4A3A4"/>
+          </p15:clr>
+        </p15:guide>
+      </p15:sldGuideLst>
+    </p:ext>
+  </p:extLst>
 </p:presentation>
 </file>
 
@@ -233,7 +249,7 @@
             <a:fld id="{2A2B9AA4-819F-8549-A06A-E1B5D9D61F62}" type="datetimeFigureOut">
               <a:rPr lang="en-US" smtClean="0"/>
               <a:pPr/>
-              <a:t>16-07-14</a:t>
+              <a:t>7/18/19</a:t>
             </a:fld>
             <a:endParaRPr lang="en-US"/>
           </a:p>
@@ -1479,13 +1495,19 @@
         </p:spPr>
         <p:txBody>
           <a:bodyPr/>
-          <a:lstStyle/>
-          <a:p>
-            <a:r>
-              <a:rPr lang="en-CA" smtClean="0"/>
+          <a:lstStyle>
+            <a:lvl1pPr>
+              <a:defRPr>
+                <a:latin typeface="+mj-lt"/>
+              </a:defRPr>
+            </a:lvl1pPr>
+          </a:lstStyle>
+          <a:p>
+            <a:r>
+              <a:rPr lang="en-CA" dirty="0"/>
               <a:t>Click to edit Master title style</a:t>
             </a:r>
-            <a:endParaRPr lang="en-US"/>
+            <a:endParaRPr lang="en-US" dirty="0"/>
           </a:p>
         </p:txBody>
       </p:sp>
@@ -1510,7 +1532,9 @@
           <a:lstStyle>
             <a:lvl1pPr marL="0" indent="0" algn="ctr">
               <a:buNone/>
-              <a:defRPr/>
+              <a:defRPr>
+                <a:latin typeface="+mn-lt"/>
+              </a:defRPr>
             </a:lvl1pPr>
             <a:lvl2pPr marL="457200" indent="0" algn="ctr">
               <a:buNone/>
@@ -1547,92 +1571,74 @@
           </a:lstStyle>
           <a:p>
             <a:r>
-              <a:rPr lang="en-CA" smtClean="0"/>
+              <a:rPr lang="en-CA" dirty="0"/>
               <a:t>Click to edit Master subtitle style</a:t>
             </a:r>
-            <a:endParaRPr lang="en-US"/>
-          </a:p>
-        </p:txBody>
-      </p:sp>
-      <p:sp>
-        <p:nvSpPr>
-          <p:cNvPr id="4" name="Date Placeholder 3"/>
+            <a:endParaRPr lang="en-US" dirty="0"/>
+          </a:p>
+        </p:txBody>
+      </p:sp>
+      <p:sp>
+        <p:nvSpPr>
+          <p:cNvPr id="7" name="Footer Placeholder 6">
+            <a:extLst>
+              <a:ext uri="{FF2B5EF4-FFF2-40B4-BE49-F238E27FC236}">
+                <a16:creationId xmlns:a16="http://schemas.microsoft.com/office/drawing/2014/main" id="{CA57918C-4FEB-FC4B-889D-A7B37C602A61}"/>
+              </a:ext>
+            </a:extLst>
+          </p:cNvPr>
           <p:cNvSpPr>
             <a:spLocks noGrp="1"/>
           </p:cNvSpPr>
           <p:nvPr>
-            <p:ph type="dt" sz="half" idx="10"/>
+            <p:ph type="ftr" sz="quarter" idx="10"/>
           </p:nvPr>
         </p:nvSpPr>
         <p:spPr/>
         <p:txBody>
           <a:bodyPr/>
-          <a:lstStyle>
-            <a:lvl1pPr>
-              <a:defRPr smtClean="0"/>
-            </a:lvl1pPr>
-          </a:lstStyle>
-          <a:p>
-            <a:fld id="{189DE702-E025-3445-B945-94C526393770}" type="datetime1">
-              <a:rPr lang="en-CA" smtClean="0"/>
-              <a:t>16-07-14</a:t>
-            </a:fld>
+          <a:lstStyle/>
+          <a:p>
             <a:endParaRPr lang="en-US"/>
           </a:p>
         </p:txBody>
       </p:sp>
       <p:sp>
         <p:nvSpPr>
-          <p:cNvPr id="5" name="Footer Placeholder 4"/>
+          <p:cNvPr id="8" name="Slide Number Placeholder 7">
+            <a:extLst>
+              <a:ext uri="{FF2B5EF4-FFF2-40B4-BE49-F238E27FC236}">
+                <a16:creationId xmlns:a16="http://schemas.microsoft.com/office/drawing/2014/main" id="{CE5DA644-BA1F-AA47-BA1C-083A9F7BC576}"/>
+              </a:ext>
+            </a:extLst>
+          </p:cNvPr>
           <p:cNvSpPr>
             <a:spLocks noGrp="1"/>
           </p:cNvSpPr>
           <p:nvPr>
-            <p:ph type="ftr" sz="quarter" idx="11"/>
+            <p:ph type="sldNum" sz="quarter" idx="11"/>
           </p:nvPr>
         </p:nvSpPr>
         <p:spPr/>
         <p:txBody>
           <a:bodyPr/>
-          <a:lstStyle>
-            <a:lvl1pPr>
-              <a:defRPr/>
-            </a:lvl1pPr>
-          </a:lstStyle>
-          <a:p>
-            <a:endParaRPr lang="en-US"/>
-          </a:p>
-        </p:txBody>
-      </p:sp>
-      <p:sp>
-        <p:nvSpPr>
-          <p:cNvPr id="6" name="Slide Number Placeholder 5"/>
-          <p:cNvSpPr>
-            <a:spLocks noGrp="1"/>
-          </p:cNvSpPr>
-          <p:nvPr>
-            <p:ph type="sldNum" sz="quarter" idx="12"/>
-          </p:nvPr>
-        </p:nvSpPr>
-        <p:spPr/>
-        <p:txBody>
-          <a:bodyPr/>
-          <a:lstStyle>
-            <a:lvl1pPr>
-              <a:defRPr smtClean="0"/>
-            </a:lvl1pPr>
-          </a:lstStyle>
-          <a:p>
-            <a:fld id="{00632DF9-8F59-3B48-8E00-329792CA07DF}" type="slidenum">
-              <a:rPr lang="en-US"/>
+          <a:lstStyle/>
+          <a:p>
+            <a:fld id="{95FC67CD-6733-D04F-B9BE-AD105949F24E}" type="slidenum">
+              <a:rPr lang="en-US" smtClean="0"/>
               <a:pPr/>
               <a:t>‹#›</a:t>
             </a:fld>
-            <a:endParaRPr lang="en-US"/>
+            <a:endParaRPr lang="en-US" dirty="0"/>
           </a:p>
         </p:txBody>
       </p:sp>
     </p:spTree>
+    <p:extLst>
+      <p:ext uri="{BB962C8B-B14F-4D97-AF65-F5344CB8AC3E}">
+        <p14:creationId xmlns:p14="http://schemas.microsoft.com/office/powerpoint/2010/main" val="137617377"/>
+      </p:ext>
+    </p:extLst>
   </p:cSld>
   <p:clrMapOvr>
     <a:masterClrMapping/>
@@ -1670,13 +1676,19 @@
         <p:spPr/>
         <p:txBody>
           <a:bodyPr/>
-          <a:lstStyle/>
-          <a:p>
-            <a:r>
-              <a:rPr lang="en-CA" smtClean="0"/>
+          <a:lstStyle>
+            <a:lvl1pPr>
+              <a:defRPr>
+                <a:latin typeface="+mj-lt"/>
+              </a:defRPr>
+            </a:lvl1pPr>
+          </a:lstStyle>
+          <a:p>
+            <a:r>
+              <a:rPr lang="en-CA" dirty="0"/>
               <a:t>Click to edit Master title style</a:t>
             </a:r>
-            <a:endParaRPr lang="en-US"/>
+            <a:endParaRPr lang="en-US" dirty="0"/>
           </a:p>
         </p:txBody>
       </p:sp>
@@ -1693,124 +1705,132 @@
         <p:spPr/>
         <p:txBody>
           <a:bodyPr vert="eaVert"/>
-          <a:lstStyle/>
+          <a:lstStyle>
+            <a:lvl1pPr>
+              <a:defRPr>
+                <a:latin typeface="+mn-lt"/>
+              </a:defRPr>
+            </a:lvl1pPr>
+            <a:lvl2pPr>
+              <a:defRPr>
+                <a:latin typeface="+mn-lt"/>
+              </a:defRPr>
+            </a:lvl2pPr>
+            <a:lvl3pPr>
+              <a:defRPr>
+                <a:latin typeface="+mn-lt"/>
+              </a:defRPr>
+            </a:lvl3pPr>
+            <a:lvl4pPr>
+              <a:defRPr>
+                <a:latin typeface="+mn-lt"/>
+              </a:defRPr>
+            </a:lvl4pPr>
+            <a:lvl5pPr>
+              <a:defRPr>
+                <a:latin typeface="+mn-lt"/>
+              </a:defRPr>
+            </a:lvl5pPr>
+          </a:lstStyle>
           <a:p>
             <a:pPr lvl="0"/>
             <a:r>
-              <a:rPr lang="en-CA" smtClean="0"/>
+              <a:rPr lang="en-CA" dirty="0"/>
               <a:t>Click to edit Master text styles</a:t>
             </a:r>
           </a:p>
           <a:p>
             <a:pPr lvl="1"/>
             <a:r>
-              <a:rPr lang="en-CA" smtClean="0"/>
+              <a:rPr lang="en-CA" dirty="0"/>
               <a:t>Second level</a:t>
             </a:r>
           </a:p>
           <a:p>
             <a:pPr lvl="2"/>
             <a:r>
-              <a:rPr lang="en-CA" smtClean="0"/>
+              <a:rPr lang="en-CA" dirty="0"/>
               <a:t>Third level</a:t>
             </a:r>
           </a:p>
           <a:p>
             <a:pPr lvl="3"/>
             <a:r>
-              <a:rPr lang="en-CA" smtClean="0"/>
+              <a:rPr lang="en-CA" dirty="0"/>
               <a:t>Fourth level</a:t>
             </a:r>
           </a:p>
           <a:p>
             <a:pPr lvl="4"/>
             <a:r>
-              <a:rPr lang="en-CA" smtClean="0"/>
+              <a:rPr lang="en-CA" dirty="0"/>
               <a:t>Fifth level</a:t>
             </a:r>
-            <a:endParaRPr lang="en-US"/>
-          </a:p>
-        </p:txBody>
-      </p:sp>
-      <p:sp>
-        <p:nvSpPr>
-          <p:cNvPr id="4" name="Date Placeholder 3"/>
+            <a:endParaRPr lang="en-US" dirty="0"/>
+          </a:p>
+        </p:txBody>
+      </p:sp>
+      <p:sp>
+        <p:nvSpPr>
+          <p:cNvPr id="7" name="Footer Placeholder 6">
+            <a:extLst>
+              <a:ext uri="{FF2B5EF4-FFF2-40B4-BE49-F238E27FC236}">
+                <a16:creationId xmlns:a16="http://schemas.microsoft.com/office/drawing/2014/main" id="{A94622E8-716D-2543-B902-025F35883533}"/>
+              </a:ext>
+            </a:extLst>
+          </p:cNvPr>
           <p:cNvSpPr>
             <a:spLocks noGrp="1"/>
           </p:cNvSpPr>
           <p:nvPr>
-            <p:ph type="dt" sz="half" idx="10"/>
+            <p:ph type="ftr" sz="quarter" idx="10"/>
           </p:nvPr>
         </p:nvSpPr>
         <p:spPr/>
         <p:txBody>
           <a:bodyPr/>
-          <a:lstStyle>
-            <a:lvl1pPr>
-              <a:defRPr smtClean="0"/>
-            </a:lvl1pPr>
-          </a:lstStyle>
-          <a:p>
-            <a:fld id="{D5756AE2-27FB-0248-A1FC-CB5CA486ADA4}" type="datetime1">
-              <a:rPr lang="en-CA" smtClean="0"/>
-              <a:t>16-07-14</a:t>
-            </a:fld>
+          <a:lstStyle/>
+          <a:p>
             <a:endParaRPr lang="en-US"/>
           </a:p>
         </p:txBody>
       </p:sp>
       <p:sp>
         <p:nvSpPr>
-          <p:cNvPr id="5" name="Footer Placeholder 4"/>
+          <p:cNvPr id="8" name="Slide Number Placeholder 7">
+            <a:extLst>
+              <a:ext uri="{FF2B5EF4-FFF2-40B4-BE49-F238E27FC236}">
+                <a16:creationId xmlns:a16="http://schemas.microsoft.com/office/drawing/2014/main" id="{7524F093-4E36-C741-82AF-EEB7333B34DF}"/>
+              </a:ext>
+            </a:extLst>
+          </p:cNvPr>
           <p:cNvSpPr>
             <a:spLocks noGrp="1"/>
           </p:cNvSpPr>
           <p:nvPr>
-            <p:ph type="ftr" sz="quarter" idx="11"/>
+            <p:ph type="sldNum" sz="quarter" idx="11"/>
           </p:nvPr>
         </p:nvSpPr>
         <p:spPr/>
         <p:txBody>
           <a:bodyPr/>
-          <a:lstStyle>
-            <a:lvl1pPr>
-              <a:defRPr/>
-            </a:lvl1pPr>
-          </a:lstStyle>
-          <a:p>
-            <a:endParaRPr lang="en-US"/>
-          </a:p>
-        </p:txBody>
-      </p:sp>
-      <p:sp>
-        <p:nvSpPr>
-          <p:cNvPr id="6" name="Slide Number Placeholder 5"/>
-          <p:cNvSpPr>
-            <a:spLocks noGrp="1"/>
-          </p:cNvSpPr>
-          <p:nvPr>
-            <p:ph type="sldNum" sz="quarter" idx="12"/>
-          </p:nvPr>
-        </p:nvSpPr>
-        <p:spPr/>
-        <p:txBody>
-          <a:bodyPr/>
-          <a:lstStyle>
-            <a:lvl1pPr>
-              <a:defRPr smtClean="0"/>
-            </a:lvl1pPr>
-          </a:lstStyle>
-          <a:p>
-            <a:fld id="{643A4320-0776-394D-B186-48379CB87F5B}" type="slidenum">
-              <a:rPr lang="en-US"/>
+          <a:lstStyle/>
+          <a:p>
+            <a:fld id="{95FC67CD-6733-D04F-B9BE-AD105949F24E}" type="slidenum">
+              <a:rPr lang="en-US" smtClean="0"/>
               <a:pPr/>
               <a:t>‹#›</a:t>
             </a:fld>
-            <a:endParaRPr lang="en-US"/>
+            <a:endParaRPr lang="en-US" dirty="0"/>
           </a:p>
         </p:txBody>
       </p:sp>
     </p:spTree>
+    <p:extLst>
+      <p:ext uri="{BB962C8B-B14F-4D97-AF65-F5344CB8AC3E}">
+        <p14:creationId xmlns:p14="http://schemas.microsoft.com/office/powerpoint/2010/main" val="3501516073"/>
+      </p:ext>
+    </p:extLst>
   </p:cSld>
   <p:clrMapOvr>
     <a:masterClrMapping/>
@@ -1853,13 +1873,19 @@
         </p:spPr>
         <p:txBody>
           <a:bodyPr vert="eaVert"/>
-          <a:lstStyle/>
-          <a:p>
-            <a:r>
-              <a:rPr lang="en-CA" smtClean="0"/>
+          <a:lstStyle>
+            <a:lvl1pPr>
+              <a:defRPr>
+                <a:latin typeface="+mj-lt"/>
+              </a:defRPr>
+            </a:lvl1pPr>
+          </a:lstStyle>
+          <a:p>
+            <a:r>
+              <a:rPr lang="en-CA" dirty="0"/>
               <a:t>Click to edit Master title style</a:t>
             </a:r>
-            <a:endParaRPr lang="en-US"/>
+            <a:endParaRPr lang="en-US" dirty="0"/>
           </a:p>
         </p:txBody>
       </p:sp>
@@ -1881,124 +1907,132 @@
         </p:spPr>
         <p:txBody>
           <a:bodyPr vert="eaVert"/>
-          <a:lstStyle/>
+          <a:lstStyle>
+            <a:lvl1pPr>
+              <a:defRPr>
+                <a:latin typeface="+mn-lt"/>
+              </a:defRPr>
+            </a:lvl1pPr>
+            <a:lvl2pPr>
+              <a:defRPr>
+                <a:latin typeface="+mn-lt"/>
+              </a:defRPr>
+            </a:lvl2pPr>
+            <a:lvl3pPr>
+              <a:defRPr>
+                <a:latin typeface="+mn-lt"/>
+              </a:defRPr>
+            </a:lvl3pPr>
+            <a:lvl4pPr>
+              <a:defRPr>
+                <a:latin typeface="+mn-lt"/>
+              </a:defRPr>
+            </a:lvl4pPr>
+            <a:lvl5pPr>
+              <a:defRPr>
+                <a:latin typeface="+mn-lt"/>
+              </a:defRPr>
+            </a:lvl5pPr>
+          </a:lstStyle>
           <a:p>
             <a:pPr lvl="0"/>
             <a:r>
-              <a:rPr lang="en-CA" smtClean="0"/>
+              <a:rPr lang="en-CA" dirty="0"/>
               <a:t>Click to edit Master text styles</a:t>
             </a:r>
           </a:p>
           <a:p>
             <a:pPr lvl="1"/>
             <a:r>
-              <a:rPr lang="en-CA" smtClean="0"/>
+              <a:rPr lang="en-CA" dirty="0"/>
               <a:t>Second level</a:t>
             </a:r>
           </a:p>
           <a:p>
             <a:pPr lvl="2"/>
             <a:r>
-              <a:rPr lang="en-CA" smtClean="0"/>
+              <a:rPr lang="en-CA" dirty="0"/>
               <a:t>Third level</a:t>
             </a:r>
           </a:p>
           <a:p>
             <a:pPr lvl="3"/>
             <a:r>
-              <a:rPr lang="en-CA" smtClean="0"/>
+              <a:rPr lang="en-CA" dirty="0"/>
               <a:t>Fourth level</a:t>
             </a:r>
           </a:p>
           <a:p>
             <a:pPr lvl="4"/>
             <a:r>
-              <a:rPr lang="en-CA" smtClean="0"/>
+              <a:rPr lang="en-CA" dirty="0"/>
               <a:t>Fifth level</a:t>
             </a:r>
-            <a:endParaRPr lang="en-US"/>
-          </a:p>
-        </p:txBody>
-      </p:sp>
-      <p:sp>
-        <p:nvSpPr>
-          <p:cNvPr id="4" name="Date Placeholder 3"/>
+            <a:endParaRPr lang="en-US" dirty="0"/>
+          </a:p>
+        </p:txBody>
+      </p:sp>
+      <p:sp>
+        <p:nvSpPr>
+          <p:cNvPr id="7" name="Footer Placeholder 6">
+            <a:extLst>
+              <a:ext uri="{FF2B5EF4-FFF2-40B4-BE49-F238E27FC236}">
+                <a16:creationId xmlns:a16="http://schemas.microsoft.com/office/drawing/2014/main" id="{AB010344-6C51-EF4E-81B3-87005283EB16}"/>
+              </a:ext>
+            </a:extLst>
+          </p:cNvPr>
           <p:cNvSpPr>
             <a:spLocks noGrp="1"/>
           </p:cNvSpPr>
           <p:nvPr>
-            <p:ph type="dt" sz="half" idx="10"/>
+            <p:ph type="ftr" sz="quarter" idx="10"/>
           </p:nvPr>
         </p:nvSpPr>
         <p:spPr/>
         <p:txBody>
           <a:bodyPr/>
-          <a:lstStyle>
-            <a:lvl1pPr>
-              <a:defRPr smtClean="0"/>
-            </a:lvl1pPr>
-          </a:lstStyle>
-          <a:p>
-            <a:fld id="{41CE06BF-3F59-6746-978B-FA3AEDC454C2}" type="datetime1">
-              <a:rPr lang="en-CA" smtClean="0"/>
-              <a:t>16-07-14</a:t>
-            </a:fld>
+          <a:lstStyle/>
+          <a:p>
             <a:endParaRPr lang="en-US"/>
           </a:p>
         </p:txBody>
       </p:sp>
       <p:sp>
         <p:nvSpPr>
-          <p:cNvPr id="5" name="Footer Placeholder 4"/>
+          <p:cNvPr id="8" name="Slide Number Placeholder 7">
+            <a:extLst>
+              <a:ext uri="{FF2B5EF4-FFF2-40B4-BE49-F238E27FC236}">
+                <a16:creationId xmlns:a16="http://schemas.microsoft.com/office/drawing/2014/main" id="{5ED49F94-3724-5E4A-B082-D0D7C38EC60C}"/>
+              </a:ext>
+            </a:extLst>
+          </p:cNvPr>
           <p:cNvSpPr>
             <a:spLocks noGrp="1"/>
           </p:cNvSpPr>
           <p:nvPr>
-            <p:ph type="ftr" sz="quarter" idx="11"/>
+            <p:ph type="sldNum" sz="quarter" idx="11"/>
           </p:nvPr>
         </p:nvSpPr>
         <p:spPr/>
         <p:txBody>
           <a:bodyPr/>
-          <a:lstStyle>
-            <a:lvl1pPr>
-              <a:defRPr/>
-            </a:lvl1pPr>
-          </a:lstStyle>
-          <a:p>
-            <a:endParaRPr lang="en-US"/>
-          </a:p>
-        </p:txBody>
-      </p:sp>
-      <p:sp>
-        <p:nvSpPr>
-          <p:cNvPr id="6" name="Slide Number Placeholder 5"/>
-          <p:cNvSpPr>
-            <a:spLocks noGrp="1"/>
-          </p:cNvSpPr>
-          <p:nvPr>
-            <p:ph type="sldNum" sz="quarter" idx="12"/>
-          </p:nvPr>
-        </p:nvSpPr>
-        <p:spPr/>
-        <p:txBody>
-          <a:bodyPr/>
-          <a:lstStyle>
-            <a:lvl1pPr>
-              <a:defRPr smtClean="0"/>
-            </a:lvl1pPr>
-          </a:lstStyle>
-          <a:p>
-            <a:fld id="{4B96FCF7-937C-E044-AB8A-F5A60A0ED7ED}" type="slidenum">
-              <a:rPr lang="en-US"/>
+          <a:lstStyle/>
+          <a:p>
+            <a:fld id="{95FC67CD-6733-D04F-B9BE-AD105949F24E}" type="slidenum">
+              <a:rPr lang="en-US" smtClean="0"/>
               <a:pPr/>
               <a:t>‹#›</a:t>
             </a:fld>
-            <a:endParaRPr lang="en-US"/>
+            <a:endParaRPr lang="en-US" dirty="0"/>
           </a:p>
         </p:txBody>
       </p:sp>
     </p:spTree>
+    <p:extLst>
+      <p:ext uri="{BB962C8B-B14F-4D97-AF65-F5344CB8AC3E}">
+        <p14:creationId xmlns:p14="http://schemas.microsoft.com/office/powerpoint/2010/main" val="2622496312"/>
+      </p:ext>
+    </p:extLst>
   </p:cSld>
   <p:clrMapOvr>
     <a:masterClrMapping/>
@@ -2036,13 +2070,19 @@
         <p:spPr/>
         <p:txBody>
           <a:bodyPr/>
-          <a:lstStyle/>
-          <a:p>
-            <a:r>
-              <a:rPr lang="en-CA" smtClean="0"/>
+          <a:lstStyle>
+            <a:lvl1pPr>
+              <a:defRPr>
+                <a:latin typeface="+mj-lt"/>
+              </a:defRPr>
+            </a:lvl1pPr>
+          </a:lstStyle>
+          <a:p>
+            <a:r>
+              <a:rPr lang="en-CA" dirty="0"/>
               <a:t>Click to edit Master title style</a:t>
             </a:r>
-            <a:endParaRPr lang="en-US"/>
+            <a:endParaRPr lang="en-US" dirty="0"/>
           </a:p>
         </p:txBody>
       </p:sp>
@@ -2059,53 +2099,110 @@
         <p:spPr/>
         <p:txBody>
           <a:bodyPr/>
-          <a:lstStyle/>
+          <a:lstStyle>
+            <a:lvl1pPr>
+              <a:defRPr>
+                <a:latin typeface="+mn-lt"/>
+              </a:defRPr>
+            </a:lvl1pPr>
+            <a:lvl2pPr>
+              <a:defRPr>
+                <a:latin typeface="+mn-lt"/>
+              </a:defRPr>
+            </a:lvl2pPr>
+            <a:lvl3pPr>
+              <a:defRPr>
+                <a:latin typeface="+mn-lt"/>
+              </a:defRPr>
+            </a:lvl3pPr>
+            <a:lvl4pPr>
+              <a:defRPr>
+                <a:latin typeface="+mn-lt"/>
+              </a:defRPr>
+            </a:lvl4pPr>
+            <a:lvl5pPr>
+              <a:defRPr>
+                <a:latin typeface="+mn-lt"/>
+              </a:defRPr>
+            </a:lvl5pPr>
+          </a:lstStyle>
           <a:p>
             <a:pPr lvl="0"/>
             <a:r>
-              <a:rPr lang="en-CA" smtClean="0"/>
+              <a:rPr lang="en-CA" dirty="0"/>
               <a:t>Click to edit Master text styles</a:t>
             </a:r>
           </a:p>
           <a:p>
             <a:pPr lvl="1"/>
             <a:r>
-              <a:rPr lang="en-CA" smtClean="0"/>
+              <a:rPr lang="en-CA" dirty="0"/>
               <a:t>Second level</a:t>
             </a:r>
           </a:p>
           <a:p>
             <a:pPr lvl="2"/>
             <a:r>
-              <a:rPr lang="en-CA" smtClean="0"/>
+              <a:rPr lang="en-CA" dirty="0"/>
               <a:t>Third level</a:t>
             </a:r>
           </a:p>
           <a:p>
             <a:pPr lvl="3"/>
             <a:r>
-              <a:rPr lang="en-CA" smtClean="0"/>
+              <a:rPr lang="en-CA" dirty="0"/>
               <a:t>Fourth level</a:t>
             </a:r>
           </a:p>
           <a:p>
             <a:pPr lvl="4"/>
             <a:r>
-              <a:rPr lang="en-CA" smtClean="0"/>
+              <a:rPr lang="en-CA" dirty="0"/>
               <a:t>Fifth level</a:t>
             </a:r>
-            <a:endParaRPr lang="en-US"/>
-          </a:p>
-        </p:txBody>
-      </p:sp>
-      <p:sp>
-        <p:nvSpPr>
-          <p:cNvPr id="4" name="Date Placeholder 3"/>
+            <a:endParaRPr lang="en-US" dirty="0"/>
+          </a:p>
+        </p:txBody>
+      </p:sp>
+      <p:sp>
+        <p:nvSpPr>
+          <p:cNvPr id="5" name="Footer Placeholder 4"/>
           <p:cNvSpPr>
             <a:spLocks noGrp="1"/>
           </p:cNvSpPr>
           <p:nvPr>
-            <p:ph type="dt" sz="half" idx="10"/>
+            <p:ph type="ftr" sz="quarter" idx="11"/>
+          </p:nvPr>
+        </p:nvSpPr>
+        <p:spPr>
+          <a:xfrm>
+            <a:off x="3124200" y="6248400"/>
+            <a:ext cx="2895600" cy="457200"/>
+          </a:xfrm>
+          <a:prstGeom prst="rect">
+            <a:avLst/>
+          </a:prstGeom>
+        </p:spPr>
+        <p:txBody>
+          <a:bodyPr/>
+          <a:lstStyle>
+            <a:lvl1pPr>
+              <a:defRPr/>
+            </a:lvl1pPr>
+          </a:lstStyle>
+          <a:p>
+            <a:endParaRPr lang="en-US"/>
+          </a:p>
+        </p:txBody>
+      </p:sp>
+      <p:sp>
+        <p:nvSpPr>
+          <p:cNvPr id="6" name="Slide Number Placeholder 5"/>
+          <p:cNvSpPr>
+            <a:spLocks noGrp="1"/>
+          </p:cNvSpPr>
+          <p:nvPr>
+            <p:ph type="sldNum" sz="quarter" idx="12"/>
           </p:nvPr>
         </p:nvSpPr>
         <p:spPr/>
@@ -2117,57 +2214,7 @@
             </a:lvl1pPr>
           </a:lstStyle>
           <a:p>
-            <a:fld id="{2670F3B6-54EB-C84D-AA55-AF79619F957E}" type="datetime1">
-              <a:rPr lang="en-CA" smtClean="0"/>
-              <a:t>16-07-14</a:t>
-            </a:fld>
-            <a:endParaRPr lang="en-US"/>
-          </a:p>
-        </p:txBody>
-      </p:sp>
-      <p:sp>
-        <p:nvSpPr>
-          <p:cNvPr id="5" name="Footer Placeholder 4"/>
-          <p:cNvSpPr>
-            <a:spLocks noGrp="1"/>
-          </p:cNvSpPr>
-          <p:nvPr>
-            <p:ph type="ftr" sz="quarter" idx="11"/>
-          </p:nvPr>
-        </p:nvSpPr>
-        <p:spPr/>
-        <p:txBody>
-          <a:bodyPr/>
-          <a:lstStyle>
-            <a:lvl1pPr>
-              <a:defRPr/>
-            </a:lvl1pPr>
-          </a:lstStyle>
-          <a:p>
-            <a:endParaRPr lang="en-US"/>
-          </a:p>
-        </p:txBody>
-      </p:sp>
-      <p:sp>
-        <p:nvSpPr>
-          <p:cNvPr id="6" name="Slide Number Placeholder 5"/>
-          <p:cNvSpPr>
-            <a:spLocks noGrp="1"/>
-          </p:cNvSpPr>
-          <p:nvPr>
-            <p:ph type="sldNum" sz="quarter" idx="12"/>
-          </p:nvPr>
-        </p:nvSpPr>
-        <p:spPr/>
-        <p:txBody>
-          <a:bodyPr/>
-          <a:lstStyle>
-            <a:lvl1pPr>
-              <a:defRPr smtClean="0"/>
-            </a:lvl1pPr>
-          </a:lstStyle>
-          <a:p>
-            <a:fld id="{4DFFAA38-3D7A-BB4F-941A-338C60DCD924}" type="slidenum">
+            <a:fld id="{D94201BD-6681-B946-ACD9-A8F6D28AC38D}" type="slidenum">
               <a:rPr lang="en-US"/>
               <a:pPr/>
               <a:t>‹#›</a:t>
@@ -2177,6 +2224,11 @@
         </p:txBody>
       </p:sp>
     </p:spTree>
+    <p:extLst>
+      <p:ext uri="{BB962C8B-B14F-4D97-AF65-F5344CB8AC3E}">
+        <p14:creationId xmlns:p14="http://schemas.microsoft.com/office/powerpoint/2010/main" val="1492000674"/>
+      </p:ext>
+    </p:extLst>
   </p:cSld>
   <p:clrMapOvr>
     <a:masterClrMapping/>
@@ -2221,15 +2273,17 @@
           <a:bodyPr anchor="t"/>
           <a:lstStyle>
             <a:lvl1pPr algn="l">
-              <a:defRPr sz="4000" b="1" cap="all"/>
+              <a:defRPr sz="4000" b="1" cap="all">
+                <a:latin typeface="+mj-lt"/>
+              </a:defRPr>
             </a:lvl1pPr>
           </a:lstStyle>
           <a:p>
             <a:r>
-              <a:rPr lang="en-CA" smtClean="0"/>
+              <a:rPr lang="en-CA" dirty="0"/>
               <a:t>Click to edit Master title style</a:t>
             </a:r>
-            <a:endParaRPr lang="en-US"/>
+            <a:endParaRPr lang="en-US" dirty="0"/>
           </a:p>
         </p:txBody>
       </p:sp>
@@ -2254,7 +2308,9 @@
           <a:lstStyle>
             <a:lvl1pPr marL="0" indent="0">
               <a:buNone/>
-              <a:defRPr sz="2000"/>
+              <a:defRPr sz="2000">
+                <a:latin typeface="+mn-lt"/>
+              </a:defRPr>
             </a:lvl1pPr>
             <a:lvl2pPr marL="457200" indent="0">
               <a:buNone/>
@@ -2292,7 +2348,7 @@
           <a:p>
             <a:pPr lvl="0"/>
             <a:r>
-              <a:rPr lang="en-CA" smtClean="0"/>
+              <a:rPr lang="en-CA" dirty="0"/>
               <a:t>Click to edit Master text styles</a:t>
             </a:r>
           </a:p>
@@ -2300,83 +2356,65 @@
       </p:sp>
       <p:sp>
         <p:nvSpPr>
-          <p:cNvPr id="4" name="Date Placeholder 3"/>
+          <p:cNvPr id="7" name="Footer Placeholder 6">
+            <a:extLst>
+              <a:ext uri="{FF2B5EF4-FFF2-40B4-BE49-F238E27FC236}">
+                <a16:creationId xmlns:a16="http://schemas.microsoft.com/office/drawing/2014/main" id="{2B039AA2-523D-0546-920D-E32D1313510F}"/>
+              </a:ext>
+            </a:extLst>
+          </p:cNvPr>
           <p:cNvSpPr>
             <a:spLocks noGrp="1"/>
           </p:cNvSpPr>
           <p:nvPr>
-            <p:ph type="dt" sz="half" idx="10"/>
+            <p:ph type="ftr" sz="quarter" idx="10"/>
           </p:nvPr>
         </p:nvSpPr>
         <p:spPr/>
         <p:txBody>
           <a:bodyPr/>
-          <a:lstStyle>
-            <a:lvl1pPr>
-              <a:defRPr smtClean="0"/>
-            </a:lvl1pPr>
-          </a:lstStyle>
-          <a:p>
-            <a:fld id="{9CF60C0C-EA18-5F4C-8D0B-520653C5B200}" type="datetime1">
-              <a:rPr lang="en-CA" smtClean="0"/>
-              <a:t>16-07-14</a:t>
-            </a:fld>
+          <a:lstStyle/>
+          <a:p>
             <a:endParaRPr lang="en-US"/>
           </a:p>
         </p:txBody>
       </p:sp>
       <p:sp>
         <p:nvSpPr>
-          <p:cNvPr id="5" name="Footer Placeholder 4"/>
+          <p:cNvPr id="8" name="Slide Number Placeholder 7">
+            <a:extLst>
+              <a:ext uri="{FF2B5EF4-FFF2-40B4-BE49-F238E27FC236}">
+                <a16:creationId xmlns:a16="http://schemas.microsoft.com/office/drawing/2014/main" id="{F86BC01E-DD3B-5E4B-95A4-DD35BF84807C}"/>
+              </a:ext>
+            </a:extLst>
+          </p:cNvPr>
           <p:cNvSpPr>
             <a:spLocks noGrp="1"/>
           </p:cNvSpPr>
           <p:nvPr>
-            <p:ph type="ftr" sz="quarter" idx="11"/>
+            <p:ph type="sldNum" sz="quarter" idx="11"/>
           </p:nvPr>
         </p:nvSpPr>
         <p:spPr/>
         <p:txBody>
           <a:bodyPr/>
-          <a:lstStyle>
-            <a:lvl1pPr>
-              <a:defRPr/>
-            </a:lvl1pPr>
-          </a:lstStyle>
-          <a:p>
-            <a:endParaRPr lang="en-US"/>
-          </a:p>
-        </p:txBody>
-      </p:sp>
-      <p:sp>
-        <p:nvSpPr>
-          <p:cNvPr id="6" name="Slide Number Placeholder 5"/>
-          <p:cNvSpPr>
-            <a:spLocks noGrp="1"/>
-          </p:cNvSpPr>
-          <p:nvPr>
-            <p:ph type="sldNum" sz="quarter" idx="12"/>
-          </p:nvPr>
-        </p:nvSpPr>
-        <p:spPr/>
-        <p:txBody>
-          <a:bodyPr/>
-          <a:lstStyle>
-            <a:lvl1pPr>
-              <a:defRPr smtClean="0"/>
-            </a:lvl1pPr>
-          </a:lstStyle>
-          <a:p>
-            <a:fld id="{1BF7D276-479A-5B45-8DD8-E84F515403C8}" type="slidenum">
-              <a:rPr lang="en-US"/>
+          <a:lstStyle/>
+          <a:p>
+            <a:fld id="{95FC67CD-6733-D04F-B9BE-AD105949F24E}" type="slidenum">
+              <a:rPr lang="en-US" smtClean="0"/>
               <a:pPr/>
               <a:t>‹#›</a:t>
             </a:fld>
-            <a:endParaRPr lang="en-US"/>
+            <a:endParaRPr lang="en-US" dirty="0"/>
           </a:p>
         </p:txBody>
       </p:sp>
     </p:spTree>
+    <p:extLst>
+      <p:ext uri="{BB962C8B-B14F-4D97-AF65-F5344CB8AC3E}">
+        <p14:creationId xmlns:p14="http://schemas.microsoft.com/office/powerpoint/2010/main" val="905525456"/>
+      </p:ext>
+    </p:extLst>
   </p:cSld>
   <p:clrMapOvr>
     <a:masterClrMapping/>
@@ -2414,13 +2452,19 @@
         <p:spPr/>
         <p:txBody>
           <a:bodyPr/>
-          <a:lstStyle/>
-          <a:p>
-            <a:r>
-              <a:rPr lang="en-CA" smtClean="0"/>
+          <a:lstStyle>
+            <a:lvl1pPr>
+              <a:defRPr>
+                <a:latin typeface="+mj-lt"/>
+              </a:defRPr>
+            </a:lvl1pPr>
+          </a:lstStyle>
+          <a:p>
+            <a:r>
+              <a:rPr lang="en-CA" dirty="0"/>
               <a:t>Click to edit Master title style</a:t>
             </a:r>
-            <a:endParaRPr lang="en-US"/>
+            <a:endParaRPr lang="en-US" dirty="0"/>
           </a:p>
         </p:txBody>
       </p:sp>
@@ -2444,19 +2488,29 @@
           <a:bodyPr/>
           <a:lstStyle>
             <a:lvl1pPr>
-              <a:defRPr sz="2800"/>
+              <a:defRPr sz="2800">
+                <a:latin typeface="+mn-lt"/>
+              </a:defRPr>
             </a:lvl1pPr>
             <a:lvl2pPr>
-              <a:defRPr sz="2400"/>
+              <a:defRPr sz="2400">
+                <a:latin typeface="+mn-lt"/>
+              </a:defRPr>
             </a:lvl2pPr>
             <a:lvl3pPr>
-              <a:defRPr sz="2000"/>
+              <a:defRPr sz="2000">
+                <a:latin typeface="+mn-lt"/>
+              </a:defRPr>
             </a:lvl3pPr>
             <a:lvl4pPr>
-              <a:defRPr sz="1800"/>
+              <a:defRPr sz="1800">
+                <a:latin typeface="+mn-lt"/>
+              </a:defRPr>
             </a:lvl4pPr>
             <a:lvl5pPr>
-              <a:defRPr sz="1800"/>
+              <a:defRPr sz="1800">
+                <a:latin typeface="+mn-lt"/>
+              </a:defRPr>
             </a:lvl5pPr>
             <a:lvl6pPr>
               <a:defRPr sz="1800"/>
@@ -2474,38 +2528,38 @@
           <a:p>
             <a:pPr lvl="0"/>
             <a:r>
-              <a:rPr lang="en-CA" smtClean="0"/>
+              <a:rPr lang="en-CA" dirty="0"/>
               <a:t>Click to edit Master text styles</a:t>
             </a:r>
           </a:p>
           <a:p>
             <a:pPr lvl="1"/>
             <a:r>
-              <a:rPr lang="en-CA" smtClean="0"/>
+              <a:rPr lang="en-CA" dirty="0"/>
               <a:t>Second level</a:t>
             </a:r>
           </a:p>
           <a:p>
             <a:pPr lvl="2"/>
             <a:r>
-              <a:rPr lang="en-CA" smtClean="0"/>
+              <a:rPr lang="en-CA" dirty="0"/>
               <a:t>Third level</a:t>
             </a:r>
           </a:p>
           <a:p>
             <a:pPr lvl="3"/>
             <a:r>
-              <a:rPr lang="en-CA" smtClean="0"/>
+              <a:rPr lang="en-CA" dirty="0"/>
               <a:t>Fourth level</a:t>
             </a:r>
           </a:p>
           <a:p>
             <a:pPr lvl="4"/>
             <a:r>
-              <a:rPr lang="en-CA" smtClean="0"/>
+              <a:rPr lang="en-CA" dirty="0"/>
               <a:t>Fifth level</a:t>
             </a:r>
-            <a:endParaRPr lang="en-US"/>
+            <a:endParaRPr lang="en-US" dirty="0"/>
           </a:p>
         </p:txBody>
       </p:sp>
@@ -2529,19 +2583,29 @@
           <a:bodyPr/>
           <a:lstStyle>
             <a:lvl1pPr>
-              <a:defRPr sz="2800"/>
+              <a:defRPr sz="2800">
+                <a:latin typeface="+mn-lt"/>
+              </a:defRPr>
             </a:lvl1pPr>
             <a:lvl2pPr>
-              <a:defRPr sz="2400"/>
+              <a:defRPr sz="2400">
+                <a:latin typeface="+mn-lt"/>
+              </a:defRPr>
             </a:lvl2pPr>
             <a:lvl3pPr>
-              <a:defRPr sz="2000"/>
+              <a:defRPr sz="2000">
+                <a:latin typeface="+mn-lt"/>
+              </a:defRPr>
             </a:lvl3pPr>
             <a:lvl4pPr>
-              <a:defRPr sz="1800"/>
+              <a:defRPr sz="1800">
+                <a:latin typeface="+mn-lt"/>
+              </a:defRPr>
             </a:lvl4pPr>
             <a:lvl5pPr>
-              <a:defRPr sz="1800"/>
+              <a:defRPr sz="1800">
+                <a:latin typeface="+mn-lt"/>
+              </a:defRPr>
             </a:lvl5pPr>
             <a:lvl6pPr>
               <a:defRPr sz="1800"/>
@@ -2559,120 +2623,102 @@
           <a:p>
             <a:pPr lvl="0"/>
             <a:r>
-              <a:rPr lang="en-CA" smtClean="0"/>
+              <a:rPr lang="en-CA" dirty="0"/>
               <a:t>Click to edit Master text styles</a:t>
             </a:r>
           </a:p>
           <a:p>
             <a:pPr lvl="1"/>
             <a:r>
-              <a:rPr lang="en-CA" smtClean="0"/>
+              <a:rPr lang="en-CA" dirty="0"/>
               <a:t>Second level</a:t>
             </a:r>
           </a:p>
           <a:p>
             <a:pPr lvl="2"/>
             <a:r>
-              <a:rPr lang="en-CA" smtClean="0"/>
+              <a:rPr lang="en-CA" dirty="0"/>
               <a:t>Third level</a:t>
             </a:r>
           </a:p>
           <a:p>
             <a:pPr lvl="3"/>
             <a:r>
-              <a:rPr lang="en-CA" smtClean="0"/>
+              <a:rPr lang="en-CA" dirty="0"/>
               <a:t>Fourth level</a:t>
             </a:r>
           </a:p>
           <a:p>
             <a:pPr lvl="4"/>
             <a:r>
-              <a:rPr lang="en-CA" smtClean="0"/>
+              <a:rPr lang="en-CA" dirty="0"/>
               <a:t>Fifth level</a:t>
             </a:r>
-            <a:endParaRPr lang="en-US"/>
-          </a:p>
-        </p:txBody>
-      </p:sp>
-      <p:sp>
-        <p:nvSpPr>
-          <p:cNvPr id="5" name="Date Placeholder 4"/>
+            <a:endParaRPr lang="en-US" dirty="0"/>
+          </a:p>
+        </p:txBody>
+      </p:sp>
+      <p:sp>
+        <p:nvSpPr>
+          <p:cNvPr id="8" name="Footer Placeholder 7">
+            <a:extLst>
+              <a:ext uri="{FF2B5EF4-FFF2-40B4-BE49-F238E27FC236}">
+                <a16:creationId xmlns:a16="http://schemas.microsoft.com/office/drawing/2014/main" id="{DA945EC4-37BF-4E43-B2AD-837601045EC0}"/>
+              </a:ext>
+            </a:extLst>
+          </p:cNvPr>
           <p:cNvSpPr>
             <a:spLocks noGrp="1"/>
           </p:cNvSpPr>
           <p:nvPr>
-            <p:ph type="dt" sz="half" idx="10"/>
+            <p:ph type="ftr" sz="quarter" idx="10"/>
           </p:nvPr>
         </p:nvSpPr>
         <p:spPr/>
         <p:txBody>
           <a:bodyPr/>
-          <a:lstStyle>
-            <a:lvl1pPr>
-              <a:defRPr smtClean="0"/>
-            </a:lvl1pPr>
-          </a:lstStyle>
-          <a:p>
-            <a:fld id="{C18B09BD-69E0-4C4A-BE44-A1B1640A4A9C}" type="datetime1">
-              <a:rPr lang="en-CA" smtClean="0"/>
-              <a:t>16-07-14</a:t>
-            </a:fld>
+          <a:lstStyle/>
+          <a:p>
             <a:endParaRPr lang="en-US"/>
           </a:p>
         </p:txBody>
       </p:sp>
       <p:sp>
         <p:nvSpPr>
-          <p:cNvPr id="6" name="Footer Placeholder 5"/>
+          <p:cNvPr id="9" name="Slide Number Placeholder 8">
+            <a:extLst>
+              <a:ext uri="{FF2B5EF4-FFF2-40B4-BE49-F238E27FC236}">
+                <a16:creationId xmlns:a16="http://schemas.microsoft.com/office/drawing/2014/main" id="{BEFEF4CF-D098-9549-A3AC-4A120E0BFA05}"/>
+              </a:ext>
+            </a:extLst>
+          </p:cNvPr>
           <p:cNvSpPr>
             <a:spLocks noGrp="1"/>
           </p:cNvSpPr>
           <p:nvPr>
-            <p:ph type="ftr" sz="quarter" idx="11"/>
+            <p:ph type="sldNum" sz="quarter" idx="11"/>
           </p:nvPr>
         </p:nvSpPr>
         <p:spPr/>
         <p:txBody>
           <a:bodyPr/>
-          <a:lstStyle>
-            <a:lvl1pPr>
-              <a:defRPr/>
-            </a:lvl1pPr>
-          </a:lstStyle>
-          <a:p>
-            <a:endParaRPr lang="en-US"/>
-          </a:p>
-        </p:txBody>
-      </p:sp>
-      <p:sp>
-        <p:nvSpPr>
-          <p:cNvPr id="7" name="Slide Number Placeholder 6"/>
-          <p:cNvSpPr>
-            <a:spLocks noGrp="1"/>
-          </p:cNvSpPr>
-          <p:nvPr>
-            <p:ph type="sldNum" sz="quarter" idx="12"/>
-          </p:nvPr>
-        </p:nvSpPr>
-        <p:spPr/>
-        <p:txBody>
-          <a:bodyPr/>
-          <a:lstStyle>
-            <a:lvl1pPr>
-              <a:defRPr smtClean="0"/>
-            </a:lvl1pPr>
-          </a:lstStyle>
-          <a:p>
-            <a:fld id="{90A7465B-A24A-EF4A-BC77-71DEFD92317D}" type="slidenum">
-              <a:rPr lang="en-US"/>
+          <a:lstStyle/>
+          <a:p>
+            <a:fld id="{95FC67CD-6733-D04F-B9BE-AD105949F24E}" type="slidenum">
+              <a:rPr lang="en-US" smtClean="0"/>
               <a:pPr/>
               <a:t>‹#›</a:t>
             </a:fld>
-            <a:endParaRPr lang="en-US"/>
+            <a:endParaRPr lang="en-US" dirty="0"/>
           </a:p>
         </p:txBody>
       </p:sp>
     </p:spTree>
+    <p:extLst>
+      <p:ext uri="{BB962C8B-B14F-4D97-AF65-F5344CB8AC3E}">
+        <p14:creationId xmlns:p14="http://schemas.microsoft.com/office/powerpoint/2010/main" val="1830047661"/>
+      </p:ext>
+    </p:extLst>
   </p:cSld>
   <p:clrMapOvr>
     <a:masterClrMapping/>
@@ -2717,15 +2763,17 @@
           <a:bodyPr/>
           <a:lstStyle>
             <a:lvl1pPr>
-              <a:defRPr/>
+              <a:defRPr>
+                <a:latin typeface="+mj-lt"/>
+              </a:defRPr>
             </a:lvl1pPr>
           </a:lstStyle>
           <a:p>
             <a:r>
-              <a:rPr lang="en-CA" smtClean="0"/>
+              <a:rPr lang="en-CA" dirty="0"/>
               <a:t>Click to edit Master title style</a:t>
             </a:r>
-            <a:endParaRPr lang="en-US"/>
+            <a:endParaRPr lang="en-US" dirty="0"/>
           </a:p>
         </p:txBody>
       </p:sp>
@@ -2750,7 +2798,9 @@
           <a:lstStyle>
             <a:lvl1pPr marL="0" indent="0">
               <a:buNone/>
-              <a:defRPr sz="2400" b="1"/>
+              <a:defRPr sz="2400" b="1">
+                <a:latin typeface="+mj-lt"/>
+              </a:defRPr>
             </a:lvl1pPr>
             <a:lvl2pPr marL="457200" indent="0">
               <a:buNone/>
@@ -2788,7 +2838,7 @@
           <a:p>
             <a:pPr lvl="0"/>
             <a:r>
-              <a:rPr lang="en-CA" smtClean="0"/>
+              <a:rPr lang="en-CA" dirty="0"/>
               <a:t>Click to edit Master text styles</a:t>
             </a:r>
           </a:p>
@@ -2814,19 +2864,29 @@
           <a:bodyPr/>
           <a:lstStyle>
             <a:lvl1pPr>
-              <a:defRPr sz="2400"/>
+              <a:defRPr sz="2400">
+                <a:latin typeface="+mn-lt"/>
+              </a:defRPr>
             </a:lvl1pPr>
             <a:lvl2pPr>
-              <a:defRPr sz="2000"/>
+              <a:defRPr sz="2000">
+                <a:latin typeface="+mn-lt"/>
+              </a:defRPr>
             </a:lvl2pPr>
             <a:lvl3pPr>
-              <a:defRPr sz="1800"/>
+              <a:defRPr sz="1800">
+                <a:latin typeface="+mn-lt"/>
+              </a:defRPr>
             </a:lvl3pPr>
             <a:lvl4pPr>
-              <a:defRPr sz="1600"/>
+              <a:defRPr sz="1600">
+                <a:latin typeface="+mn-lt"/>
+              </a:defRPr>
             </a:lvl4pPr>
             <a:lvl5pPr>
-              <a:defRPr sz="1600"/>
+              <a:defRPr sz="1600">
+                <a:latin typeface="+mn-lt"/>
+              </a:defRPr>
             </a:lvl5pPr>
             <a:lvl6pPr>
               <a:defRPr sz="1600"/>
@@ -2844,38 +2904,38 @@
           <a:p>
             <a:pPr lvl="0"/>
             <a:r>
-              <a:rPr lang="en-CA" smtClean="0"/>
+              <a:rPr lang="en-CA" dirty="0"/>
               <a:t>Click to edit Master text styles</a:t>
             </a:r>
           </a:p>
           <a:p>
             <a:pPr lvl="1"/>
             <a:r>
-              <a:rPr lang="en-CA" smtClean="0"/>
+              <a:rPr lang="en-CA" dirty="0"/>
               <a:t>Second level</a:t>
             </a:r>
           </a:p>
           <a:p>
             <a:pPr lvl="2"/>
             <a:r>
-              <a:rPr lang="en-CA" smtClean="0"/>
+              <a:rPr lang="en-CA" dirty="0"/>
               <a:t>Third level</a:t>
             </a:r>
           </a:p>
           <a:p>
             <a:pPr lvl="3"/>
             <a:r>
-              <a:rPr lang="en-CA" smtClean="0"/>
+              <a:rPr lang="en-CA" dirty="0"/>
               <a:t>Fourth level</a:t>
             </a:r>
           </a:p>
           <a:p>
             <a:pPr lvl="4"/>
             <a:r>
-              <a:rPr lang="en-CA" smtClean="0"/>
+              <a:rPr lang="en-CA" dirty="0"/>
               <a:t>Fifth level</a:t>
             </a:r>
-            <a:endParaRPr lang="en-US"/>
+            <a:endParaRPr lang="en-US" dirty="0"/>
           </a:p>
         </p:txBody>
       </p:sp>
@@ -2900,7 +2960,9 @@
           <a:lstStyle>
             <a:lvl1pPr marL="0" indent="0">
               <a:buNone/>
-              <a:defRPr sz="2400" b="1"/>
+              <a:defRPr sz="2400" b="1">
+                <a:latin typeface="+mj-lt"/>
+              </a:defRPr>
             </a:lvl1pPr>
             <a:lvl2pPr marL="457200" indent="0">
               <a:buNone/>
@@ -2938,7 +3000,7 @@
           <a:p>
             <a:pPr lvl="0"/>
             <a:r>
-              <a:rPr lang="en-CA" smtClean="0"/>
+              <a:rPr lang="en-CA" dirty="0"/>
               <a:t>Click to edit Master text styles</a:t>
             </a:r>
           </a:p>
@@ -2964,19 +3026,29 @@
           <a:bodyPr/>
           <a:lstStyle>
             <a:lvl1pPr>
-              <a:defRPr sz="2400"/>
+              <a:defRPr sz="2400">
+                <a:latin typeface="+mn-lt"/>
+              </a:defRPr>
             </a:lvl1pPr>
             <a:lvl2pPr>
-              <a:defRPr sz="2000"/>
+              <a:defRPr sz="2000">
+                <a:latin typeface="+mn-lt"/>
+              </a:defRPr>
             </a:lvl2pPr>
             <a:lvl3pPr>
-              <a:defRPr sz="1800"/>
+              <a:defRPr sz="1800">
+                <a:latin typeface="+mn-lt"/>
+              </a:defRPr>
             </a:lvl3pPr>
             <a:lvl4pPr>
-              <a:defRPr sz="1600"/>
+              <a:defRPr sz="1600">
+                <a:latin typeface="+mn-lt"/>
+              </a:defRPr>
             </a:lvl4pPr>
             <a:lvl5pPr>
-              <a:defRPr sz="1600"/>
+              <a:defRPr sz="1600">
+                <a:latin typeface="+mn-lt"/>
+              </a:defRPr>
             </a:lvl5pPr>
             <a:lvl6pPr>
               <a:defRPr sz="1600"/>
@@ -2994,120 +3066,102 @@
           <a:p>
             <a:pPr lvl="0"/>
             <a:r>
-              <a:rPr lang="en-CA" smtClean="0"/>
+              <a:rPr lang="en-CA" dirty="0"/>
               <a:t>Click to edit Master text styles</a:t>
             </a:r>
           </a:p>
           <a:p>
             <a:pPr lvl="1"/>
             <a:r>
-              <a:rPr lang="en-CA" smtClean="0"/>
+              <a:rPr lang="en-CA" dirty="0"/>
               <a:t>Second level</a:t>
             </a:r>
           </a:p>
           <a:p>
             <a:pPr lvl="2"/>
             <a:r>
-              <a:rPr lang="en-CA" smtClean="0"/>
+              <a:rPr lang="en-CA" dirty="0"/>
               <a:t>Third level</a:t>
             </a:r>
           </a:p>
           <a:p>
             <a:pPr lvl="3"/>
             <a:r>
-              <a:rPr lang="en-CA" smtClean="0"/>
+              <a:rPr lang="en-CA" dirty="0"/>
               <a:t>Fourth level</a:t>
             </a:r>
           </a:p>
           <a:p>
             <a:pPr lvl="4"/>
             <a:r>
-              <a:rPr lang="en-CA" smtClean="0"/>
+              <a:rPr lang="en-CA" dirty="0"/>
               <a:t>Fifth level</a:t>
             </a:r>
-            <a:endParaRPr lang="en-US"/>
-          </a:p>
-        </p:txBody>
-      </p:sp>
-      <p:sp>
-        <p:nvSpPr>
-          <p:cNvPr id="7" name="Date Placeholder 6"/>
+            <a:endParaRPr lang="en-US" dirty="0"/>
+          </a:p>
+        </p:txBody>
+      </p:sp>
+      <p:sp>
+        <p:nvSpPr>
+          <p:cNvPr id="10" name="Footer Placeholder 9">
+            <a:extLst>
+              <a:ext uri="{FF2B5EF4-FFF2-40B4-BE49-F238E27FC236}">
+                <a16:creationId xmlns:a16="http://schemas.microsoft.com/office/drawing/2014/main" id="{0912E499-92DE-AB4A-A5B0-FD67B2273F7D}"/>
+              </a:ext>
+            </a:extLst>
+          </p:cNvPr>
           <p:cNvSpPr>
             <a:spLocks noGrp="1"/>
           </p:cNvSpPr>
           <p:nvPr>
-            <p:ph type="dt" sz="half" idx="10"/>
+            <p:ph type="ftr" sz="quarter" idx="10"/>
           </p:nvPr>
         </p:nvSpPr>
         <p:spPr/>
         <p:txBody>
           <a:bodyPr/>
-          <a:lstStyle>
-            <a:lvl1pPr>
-              <a:defRPr smtClean="0"/>
-            </a:lvl1pPr>
-          </a:lstStyle>
-          <a:p>
-            <a:fld id="{2BBAD539-6254-AE45-AF34-8E7C083AEB08}" type="datetime1">
-              <a:rPr lang="en-CA" smtClean="0"/>
-              <a:t>16-07-14</a:t>
-            </a:fld>
+          <a:lstStyle/>
+          <a:p>
             <a:endParaRPr lang="en-US"/>
           </a:p>
         </p:txBody>
       </p:sp>
       <p:sp>
         <p:nvSpPr>
-          <p:cNvPr id="8" name="Footer Placeholder 7"/>
+          <p:cNvPr id="11" name="Slide Number Placeholder 10">
+            <a:extLst>
+              <a:ext uri="{FF2B5EF4-FFF2-40B4-BE49-F238E27FC236}">
+                <a16:creationId xmlns:a16="http://schemas.microsoft.com/office/drawing/2014/main" id="{80D4789F-B319-FB45-8996-99D418A3599C}"/>
+              </a:ext>
+            </a:extLst>
+          </p:cNvPr>
           <p:cNvSpPr>
             <a:spLocks noGrp="1"/>
           </p:cNvSpPr>
           <p:nvPr>
-            <p:ph type="ftr" sz="quarter" idx="11"/>
+            <p:ph type="sldNum" sz="quarter" idx="11"/>
           </p:nvPr>
         </p:nvSpPr>
         <p:spPr/>
         <p:txBody>
           <a:bodyPr/>
-          <a:lstStyle>
-            <a:lvl1pPr>
-              <a:defRPr/>
-            </a:lvl1pPr>
-          </a:lstStyle>
-          <a:p>
-            <a:endParaRPr lang="en-US"/>
-          </a:p>
-        </p:txBody>
-      </p:sp>
-      <p:sp>
-        <p:nvSpPr>
-          <p:cNvPr id="9" name="Slide Number Placeholder 8"/>
-          <p:cNvSpPr>
-            <a:spLocks noGrp="1"/>
-          </p:cNvSpPr>
-          <p:nvPr>
-            <p:ph type="sldNum" sz="quarter" idx="12"/>
-          </p:nvPr>
-        </p:nvSpPr>
-        <p:spPr/>
-        <p:txBody>
-          <a:bodyPr/>
-          <a:lstStyle>
-            <a:lvl1pPr>
-              <a:defRPr smtClean="0"/>
-            </a:lvl1pPr>
-          </a:lstStyle>
-          <a:p>
-            <a:fld id="{468512B9-2EBD-5143-B160-2F31E1336FC2}" type="slidenum">
-              <a:rPr lang="en-US"/>
+          <a:lstStyle/>
+          <a:p>
+            <a:fld id="{95FC67CD-6733-D04F-B9BE-AD105949F24E}" type="slidenum">
+              <a:rPr lang="en-US" smtClean="0"/>
               <a:pPr/>
               <a:t>‹#›</a:t>
             </a:fld>
-            <a:endParaRPr lang="en-US"/>
+            <a:endParaRPr lang="en-US" dirty="0"/>
           </a:p>
         </p:txBody>
       </p:sp>
     </p:spTree>
+    <p:extLst>
+      <p:ext uri="{BB962C8B-B14F-4D97-AF65-F5344CB8AC3E}">
+        <p14:creationId xmlns:p14="http://schemas.microsoft.com/office/powerpoint/2010/main" val="362024689"/>
+      </p:ext>
+    </p:extLst>
   </p:cSld>
   <p:clrMapOvr>
     <a:masterClrMapping/>
@@ -3145,95 +3199,83 @@
         <p:spPr/>
         <p:txBody>
           <a:bodyPr/>
-          <a:lstStyle/>
-          <a:p>
-            <a:r>
-              <a:rPr lang="en-CA" smtClean="0"/>
+          <a:lstStyle>
+            <a:lvl1pPr>
+              <a:defRPr>
+                <a:latin typeface="+mj-lt"/>
+              </a:defRPr>
+            </a:lvl1pPr>
+          </a:lstStyle>
+          <a:p>
+            <a:r>
+              <a:rPr lang="en-CA" dirty="0"/>
               <a:t>Click to edit Master title style</a:t>
             </a:r>
-            <a:endParaRPr lang="en-US"/>
-          </a:p>
-        </p:txBody>
-      </p:sp>
-      <p:sp>
-        <p:nvSpPr>
-          <p:cNvPr id="3" name="Date Placeholder 2"/>
+            <a:endParaRPr lang="en-US" dirty="0"/>
+          </a:p>
+        </p:txBody>
+      </p:sp>
+      <p:sp>
+        <p:nvSpPr>
+          <p:cNvPr id="6" name="Footer Placeholder 5">
+            <a:extLst>
+              <a:ext uri="{FF2B5EF4-FFF2-40B4-BE49-F238E27FC236}">
+                <a16:creationId xmlns:a16="http://schemas.microsoft.com/office/drawing/2014/main" id="{96BDBB7E-298A-4445-97E1-4B099A07ED3A}"/>
+              </a:ext>
+            </a:extLst>
+          </p:cNvPr>
           <p:cNvSpPr>
             <a:spLocks noGrp="1"/>
           </p:cNvSpPr>
           <p:nvPr>
-            <p:ph type="dt" sz="half" idx="10"/>
+            <p:ph type="ftr" sz="quarter" idx="10"/>
           </p:nvPr>
         </p:nvSpPr>
         <p:spPr/>
         <p:txBody>
           <a:bodyPr/>
-          <a:lstStyle>
-            <a:lvl1pPr>
-              <a:defRPr smtClean="0"/>
-            </a:lvl1pPr>
-          </a:lstStyle>
-          <a:p>
-            <a:fld id="{5C626E82-6000-4041-AFBB-808EA33BB576}" type="datetime1">
-              <a:rPr lang="en-CA" smtClean="0"/>
-              <a:t>16-07-14</a:t>
-            </a:fld>
+          <a:lstStyle/>
+          <a:p>
             <a:endParaRPr lang="en-US"/>
           </a:p>
         </p:txBody>
       </p:sp>
       <p:sp>
         <p:nvSpPr>
-          <p:cNvPr id="4" name="Footer Placeholder 3"/>
+          <p:cNvPr id="7" name="Slide Number Placeholder 6">
+            <a:extLst>
+              <a:ext uri="{FF2B5EF4-FFF2-40B4-BE49-F238E27FC236}">
+                <a16:creationId xmlns:a16="http://schemas.microsoft.com/office/drawing/2014/main" id="{A7895EC8-D916-8648-B520-23F9FC802EB0}"/>
+              </a:ext>
+            </a:extLst>
+          </p:cNvPr>
           <p:cNvSpPr>
             <a:spLocks noGrp="1"/>
           </p:cNvSpPr>
           <p:nvPr>
-            <p:ph type="ftr" sz="quarter" idx="11"/>
+            <p:ph type="sldNum" sz="quarter" idx="11"/>
           </p:nvPr>
         </p:nvSpPr>
         <p:spPr/>
         <p:txBody>
           <a:bodyPr/>
-          <a:lstStyle>
-            <a:lvl1pPr>
-              <a:defRPr/>
-            </a:lvl1pPr>
-          </a:lstStyle>
-          <a:p>
-            <a:endParaRPr lang="en-US"/>
-          </a:p>
-        </p:txBody>
-      </p:sp>
-      <p:sp>
-        <p:nvSpPr>
-          <p:cNvPr id="5" name="Slide Number Placeholder 4"/>
-          <p:cNvSpPr>
-            <a:spLocks noGrp="1"/>
-          </p:cNvSpPr>
-          <p:nvPr>
-            <p:ph type="sldNum" sz="quarter" idx="12"/>
-          </p:nvPr>
-        </p:nvSpPr>
-        <p:spPr/>
-        <p:txBody>
-          <a:bodyPr/>
-          <a:lstStyle>
-            <a:lvl1pPr>
-              <a:defRPr smtClean="0"/>
-            </a:lvl1pPr>
-          </a:lstStyle>
-          <a:p>
-            <a:fld id="{37B6CB5A-F5BD-474A-BDA3-1E989790071A}" type="slidenum">
-              <a:rPr lang="en-US"/>
+          <a:lstStyle/>
+          <a:p>
+            <a:fld id="{95FC67CD-6733-D04F-B9BE-AD105949F24E}" type="slidenum">
+              <a:rPr lang="en-US" smtClean="0"/>
               <a:pPr/>
               <a:t>‹#›</a:t>
             </a:fld>
-            <a:endParaRPr lang="en-US"/>
+            <a:endParaRPr lang="en-US" dirty="0"/>
           </a:p>
         </p:txBody>
       </p:sp>
     </p:spTree>
+    <p:extLst>
+      <p:ext uri="{BB962C8B-B14F-4D97-AF65-F5344CB8AC3E}">
+        <p14:creationId xmlns:p14="http://schemas.microsoft.com/office/powerpoint/2010/main" val="154072286"/>
+      </p:ext>
+    </p:extLst>
   </p:cSld>
   <p:clrMapOvr>
     <a:masterClrMapping/>
@@ -3260,83 +3302,65 @@
       </p:grpSpPr>
       <p:sp>
         <p:nvSpPr>
-          <p:cNvPr id="2" name="Date Placeholder 1"/>
+          <p:cNvPr id="5" name="Footer Placeholder 4">
+            <a:extLst>
+              <a:ext uri="{FF2B5EF4-FFF2-40B4-BE49-F238E27FC236}">
+                <a16:creationId xmlns:a16="http://schemas.microsoft.com/office/drawing/2014/main" id="{5DF03754-C429-BF4B-85C9-F1D1C975E80F}"/>
+              </a:ext>
+            </a:extLst>
+          </p:cNvPr>
           <p:cNvSpPr>
             <a:spLocks noGrp="1"/>
           </p:cNvSpPr>
           <p:nvPr>
-            <p:ph type="dt" sz="half" idx="10"/>
+            <p:ph type="ftr" sz="quarter" idx="10"/>
           </p:nvPr>
         </p:nvSpPr>
         <p:spPr/>
         <p:txBody>
           <a:bodyPr/>
-          <a:lstStyle>
-            <a:lvl1pPr>
-              <a:defRPr smtClean="0"/>
-            </a:lvl1pPr>
-          </a:lstStyle>
-          <a:p>
-            <a:fld id="{BFECD3B5-8C59-AA4B-9CC6-02B6A11EB52B}" type="datetime1">
-              <a:rPr lang="en-CA" smtClean="0"/>
-              <a:t>16-07-14</a:t>
-            </a:fld>
+          <a:lstStyle/>
+          <a:p>
             <a:endParaRPr lang="en-US"/>
           </a:p>
         </p:txBody>
       </p:sp>
       <p:sp>
         <p:nvSpPr>
-          <p:cNvPr id="3" name="Footer Placeholder 2"/>
+          <p:cNvPr id="6" name="Slide Number Placeholder 5">
+            <a:extLst>
+              <a:ext uri="{FF2B5EF4-FFF2-40B4-BE49-F238E27FC236}">
+                <a16:creationId xmlns:a16="http://schemas.microsoft.com/office/drawing/2014/main" id="{53E846D2-4831-1148-91F0-086A1F9C711D}"/>
+              </a:ext>
+            </a:extLst>
+          </p:cNvPr>
           <p:cNvSpPr>
             <a:spLocks noGrp="1"/>
           </p:cNvSpPr>
           <p:nvPr>
-            <p:ph type="ftr" sz="quarter" idx="11"/>
+            <p:ph type="sldNum" sz="quarter" idx="11"/>
           </p:nvPr>
         </p:nvSpPr>
         <p:spPr/>
         <p:txBody>
           <a:bodyPr/>
-          <a:lstStyle>
-            <a:lvl1pPr>
-              <a:defRPr/>
-            </a:lvl1pPr>
-          </a:lstStyle>
-          <a:p>
-            <a:endParaRPr lang="en-US"/>
-          </a:p>
-        </p:txBody>
-      </p:sp>
-      <p:sp>
-        <p:nvSpPr>
-          <p:cNvPr id="4" name="Slide Number Placeholder 3"/>
-          <p:cNvSpPr>
-            <a:spLocks noGrp="1"/>
-          </p:cNvSpPr>
-          <p:nvPr>
-            <p:ph type="sldNum" sz="quarter" idx="12"/>
-          </p:nvPr>
-        </p:nvSpPr>
-        <p:spPr/>
-        <p:txBody>
-          <a:bodyPr/>
-          <a:lstStyle>
-            <a:lvl1pPr>
-              <a:defRPr smtClean="0"/>
-            </a:lvl1pPr>
-          </a:lstStyle>
-          <a:p>
-            <a:fld id="{C1F62FDB-F864-E842-91C2-6712A2A87806}" type="slidenum">
-              <a:rPr lang="en-US"/>
+          <a:lstStyle/>
+          <a:p>
+            <a:fld id="{95FC67CD-6733-D04F-B9BE-AD105949F24E}" type="slidenum">
+              <a:rPr lang="en-US" smtClean="0"/>
               <a:pPr/>
               <a:t>‹#›</a:t>
             </a:fld>
-            <a:endParaRPr lang="en-US"/>
+            <a:endParaRPr lang="en-US" dirty="0"/>
           </a:p>
         </p:txBody>
       </p:sp>
     </p:spTree>
+    <p:extLst>
+      <p:ext uri="{BB962C8B-B14F-4D97-AF65-F5344CB8AC3E}">
+        <p14:creationId xmlns:p14="http://schemas.microsoft.com/office/powerpoint/2010/main" val="777155731"/>
+      </p:ext>
+    </p:extLst>
   </p:cSld>
   <p:clrMapOvr>
     <a:masterClrMapping/>
@@ -3381,15 +3405,17 @@
           <a:bodyPr anchor="b"/>
           <a:lstStyle>
             <a:lvl1pPr algn="l">
-              <a:defRPr sz="2000" b="1"/>
+              <a:defRPr sz="2000" b="1">
+                <a:latin typeface="+mj-lt"/>
+              </a:defRPr>
             </a:lvl1pPr>
           </a:lstStyle>
           <a:p>
             <a:r>
-              <a:rPr lang="en-CA" smtClean="0"/>
+              <a:rPr lang="en-CA" dirty="0"/>
               <a:t>Click to edit Master title style</a:t>
             </a:r>
-            <a:endParaRPr lang="en-US"/>
+            <a:endParaRPr lang="en-US" dirty="0"/>
           </a:p>
         </p:txBody>
       </p:sp>
@@ -3413,19 +3439,29 @@
           <a:bodyPr/>
           <a:lstStyle>
             <a:lvl1pPr>
-              <a:defRPr sz="3200"/>
+              <a:defRPr sz="3200">
+                <a:latin typeface="+mn-lt"/>
+              </a:defRPr>
             </a:lvl1pPr>
             <a:lvl2pPr>
-              <a:defRPr sz="2800"/>
+              <a:defRPr sz="2800">
+                <a:latin typeface="+mn-lt"/>
+              </a:defRPr>
             </a:lvl2pPr>
             <a:lvl3pPr>
-              <a:defRPr sz="2400"/>
+              <a:defRPr sz="2400">
+                <a:latin typeface="+mn-lt"/>
+              </a:defRPr>
             </a:lvl3pPr>
             <a:lvl4pPr>
-              <a:defRPr sz="2000"/>
+              <a:defRPr sz="2000">
+                <a:latin typeface="+mn-lt"/>
+              </a:defRPr>
             </a:lvl4pPr>
             <a:lvl5pPr>
-              <a:defRPr sz="2000"/>
+              <a:defRPr sz="2000">
+                <a:latin typeface="+mn-lt"/>
+              </a:defRPr>
             </a:lvl5pPr>
             <a:lvl6pPr>
               <a:defRPr sz="2000"/>
@@ -3443,38 +3479,38 @@
           <a:p>
             <a:pPr lvl="0"/>
             <a:r>
-              <a:rPr lang="en-CA" smtClean="0"/>
+              <a:rPr lang="en-CA" dirty="0"/>
               <a:t>Click to edit Master text styles</a:t>
             </a:r>
           </a:p>
           <a:p>
             <a:pPr lvl="1"/>
             <a:r>
-              <a:rPr lang="en-CA" smtClean="0"/>
+              <a:rPr lang="en-CA" dirty="0"/>
               <a:t>Second level</a:t>
             </a:r>
           </a:p>
           <a:p>
             <a:pPr lvl="2"/>
             <a:r>
-              <a:rPr lang="en-CA" smtClean="0"/>
+              <a:rPr lang="en-CA" dirty="0"/>
               <a:t>Third level</a:t>
             </a:r>
           </a:p>
           <a:p>
             <a:pPr lvl="3"/>
             <a:r>
-              <a:rPr lang="en-CA" smtClean="0"/>
+              <a:rPr lang="en-CA" dirty="0"/>
               <a:t>Fourth level</a:t>
             </a:r>
           </a:p>
           <a:p>
             <a:pPr lvl="4"/>
             <a:r>
-              <a:rPr lang="en-CA" smtClean="0"/>
+              <a:rPr lang="en-CA" dirty="0"/>
               <a:t>Fifth level</a:t>
             </a:r>
-            <a:endParaRPr lang="en-US"/>
+            <a:endParaRPr lang="en-US" dirty="0"/>
           </a:p>
         </p:txBody>
       </p:sp>
@@ -3499,7 +3535,9 @@
           <a:lstStyle>
             <a:lvl1pPr marL="0" indent="0">
               <a:buNone/>
-              <a:defRPr sz="1400"/>
+              <a:defRPr sz="1400">
+                <a:latin typeface="+mn-lt"/>
+              </a:defRPr>
             </a:lvl1pPr>
             <a:lvl2pPr marL="457200" indent="0">
               <a:buNone/>
@@ -3537,7 +3575,7 @@
           <a:p>
             <a:pPr lvl="0"/>
             <a:r>
-              <a:rPr lang="en-CA" smtClean="0"/>
+              <a:rPr lang="en-CA" dirty="0"/>
               <a:t>Click to edit Master text styles</a:t>
             </a:r>
           </a:p>
@@ -3545,83 +3583,65 @@
       </p:sp>
       <p:sp>
         <p:nvSpPr>
-          <p:cNvPr id="5" name="Date Placeholder 4"/>
+          <p:cNvPr id="8" name="Footer Placeholder 7">
+            <a:extLst>
+              <a:ext uri="{FF2B5EF4-FFF2-40B4-BE49-F238E27FC236}">
+                <a16:creationId xmlns:a16="http://schemas.microsoft.com/office/drawing/2014/main" id="{1FB8657E-D33B-074B-AE26-E7CBD7232F89}"/>
+              </a:ext>
+            </a:extLst>
+          </p:cNvPr>
           <p:cNvSpPr>
             <a:spLocks noGrp="1"/>
           </p:cNvSpPr>
           <p:nvPr>
-            <p:ph type="dt" sz="half" idx="10"/>
+            <p:ph type="ftr" sz="quarter" idx="10"/>
           </p:nvPr>
         </p:nvSpPr>
         <p:spPr/>
         <p:txBody>
           <a:bodyPr/>
-          <a:lstStyle>
-            <a:lvl1pPr>
-              <a:defRPr smtClean="0"/>
-            </a:lvl1pPr>
-          </a:lstStyle>
-          <a:p>
-            <a:fld id="{63A54ACA-1BAF-5B46-BB1E-58DDD8C0EAAD}" type="datetime1">
-              <a:rPr lang="en-CA" smtClean="0"/>
-              <a:t>16-07-14</a:t>
-            </a:fld>
+          <a:lstStyle/>
+          <a:p>
             <a:endParaRPr lang="en-US"/>
           </a:p>
         </p:txBody>
       </p:sp>
       <p:sp>
         <p:nvSpPr>
-          <p:cNvPr id="6" name="Footer Placeholder 5"/>
+          <p:cNvPr id="9" name="Slide Number Placeholder 8">
+            <a:extLst>
+              <a:ext uri="{FF2B5EF4-FFF2-40B4-BE49-F238E27FC236}">
+                <a16:creationId xmlns:a16="http://schemas.microsoft.com/office/drawing/2014/main" id="{212E3D66-C201-A64A-A27B-A535DB26C750}"/>
+              </a:ext>
+            </a:extLst>
+          </p:cNvPr>
           <p:cNvSpPr>
             <a:spLocks noGrp="1"/>
           </p:cNvSpPr>
           <p:nvPr>
-            <p:ph type="ftr" sz="quarter" idx="11"/>
+            <p:ph type="sldNum" sz="quarter" idx="11"/>
           </p:nvPr>
         </p:nvSpPr>
         <p:spPr/>
         <p:txBody>
           <a:bodyPr/>
-          <a:lstStyle>
-            <a:lvl1pPr>
-              <a:defRPr/>
-            </a:lvl1pPr>
-          </a:lstStyle>
-          <a:p>
-            <a:endParaRPr lang="en-US"/>
-          </a:p>
-        </p:txBody>
-      </p:sp>
-      <p:sp>
-        <p:nvSpPr>
-          <p:cNvPr id="7" name="Slide Number Placeholder 6"/>
-          <p:cNvSpPr>
-            <a:spLocks noGrp="1"/>
-          </p:cNvSpPr>
-          <p:nvPr>
-            <p:ph type="sldNum" sz="quarter" idx="12"/>
-          </p:nvPr>
-        </p:nvSpPr>
-        <p:spPr/>
-        <p:txBody>
-          <a:bodyPr/>
-          <a:lstStyle>
-            <a:lvl1pPr>
-              <a:defRPr smtClean="0"/>
-            </a:lvl1pPr>
-          </a:lstStyle>
-          <a:p>
-            <a:fld id="{FAD6E7CC-0CBE-234E-AA50-75399A4F7BEF}" type="slidenum">
-              <a:rPr lang="en-US"/>
+          <a:lstStyle/>
+          <a:p>
+            <a:fld id="{95FC67CD-6733-D04F-B9BE-AD105949F24E}" type="slidenum">
+              <a:rPr lang="en-US" smtClean="0"/>
               <a:pPr/>
               <a:t>‹#›</a:t>
             </a:fld>
-            <a:endParaRPr lang="en-US"/>
+            <a:endParaRPr lang="en-US" dirty="0"/>
           </a:p>
         </p:txBody>
       </p:sp>
     </p:spTree>
+    <p:extLst>
+      <p:ext uri="{BB962C8B-B14F-4D97-AF65-F5344CB8AC3E}">
+        <p14:creationId xmlns:p14="http://schemas.microsoft.com/office/powerpoint/2010/main" val="120392502"/>
+      </p:ext>
+    </p:extLst>
   </p:cSld>
   <p:clrMapOvr>
     <a:masterClrMapping/>
@@ -3666,15 +3686,17 @@
           <a:bodyPr anchor="b"/>
           <a:lstStyle>
             <a:lvl1pPr algn="l">
-              <a:defRPr sz="2000" b="1"/>
+              <a:defRPr sz="2000" b="1">
+                <a:latin typeface="+mj-lt"/>
+              </a:defRPr>
             </a:lvl1pPr>
           </a:lstStyle>
           <a:p>
             <a:r>
-              <a:rPr lang="en-CA" smtClean="0"/>
+              <a:rPr lang="en-CA" dirty="0"/>
               <a:t>Click to edit Master title style</a:t>
             </a:r>
-            <a:endParaRPr lang="en-US"/>
+            <a:endParaRPr lang="en-US" dirty="0"/>
           </a:p>
         </p:txBody>
       </p:sp>
@@ -3735,7 +3757,7 @@
             </a:lvl9pPr>
           </a:lstStyle>
           <a:p>
-            <a:endParaRPr lang="en-US"/>
+            <a:endParaRPr lang="en-US" dirty="0"/>
           </a:p>
         </p:txBody>
       </p:sp>
@@ -3760,7 +3782,9 @@
           <a:lstStyle>
             <a:lvl1pPr marL="0" indent="0">
               <a:buNone/>
-              <a:defRPr sz="1400"/>
+              <a:defRPr sz="1400">
+                <a:latin typeface="+mn-lt"/>
+              </a:defRPr>
             </a:lvl1pPr>
             <a:lvl2pPr marL="457200" indent="0">
               <a:buNone/>
@@ -3798,7 +3822,7 @@
           <a:p>
             <a:pPr lvl="0"/>
             <a:r>
-              <a:rPr lang="en-CA" smtClean="0"/>
+              <a:rPr lang="en-CA" dirty="0"/>
               <a:t>Click to edit Master text styles</a:t>
             </a:r>
           </a:p>
@@ -3806,83 +3830,65 @@
       </p:sp>
       <p:sp>
         <p:nvSpPr>
-          <p:cNvPr id="5" name="Date Placeholder 4"/>
+          <p:cNvPr id="8" name="Footer Placeholder 7">
+            <a:extLst>
+              <a:ext uri="{FF2B5EF4-FFF2-40B4-BE49-F238E27FC236}">
+                <a16:creationId xmlns:a16="http://schemas.microsoft.com/office/drawing/2014/main" id="{B5BB785B-8CD1-0040-A247-EDEF010C15C9}"/>
+              </a:ext>
+            </a:extLst>
+          </p:cNvPr>
           <p:cNvSpPr>
             <a:spLocks noGrp="1"/>
           </p:cNvSpPr>
           <p:nvPr>
-            <p:ph type="dt" sz="half" idx="10"/>
+            <p:ph type="ftr" sz="quarter" idx="10"/>
           </p:nvPr>
         </p:nvSpPr>
         <p:spPr/>
         <p:txBody>
           <a:bodyPr/>
-          <a:lstStyle>
-            <a:lvl1pPr>
-              <a:defRPr smtClean="0"/>
-            </a:lvl1pPr>
-          </a:lstStyle>
-          <a:p>
-            <a:fld id="{C6642311-92FD-1548-BF2E-CFE77B0BCFC5}" type="datetime1">
-              <a:rPr lang="en-CA" smtClean="0"/>
-              <a:t>16-07-14</a:t>
-            </a:fld>
+          <a:lstStyle/>
+          <a:p>
             <a:endParaRPr lang="en-US"/>
           </a:p>
         </p:txBody>
       </p:sp>
       <p:sp>
         <p:nvSpPr>
-          <p:cNvPr id="6" name="Footer Placeholder 5"/>
+          <p:cNvPr id="9" name="Slide Number Placeholder 8">
+            <a:extLst>
+              <a:ext uri="{FF2B5EF4-FFF2-40B4-BE49-F238E27FC236}">
+                <a16:creationId xmlns:a16="http://schemas.microsoft.com/office/drawing/2014/main" id="{A1275E30-5B29-BD43-B756-3D1D1E7E12BD}"/>
+              </a:ext>
+            </a:extLst>
+          </p:cNvPr>
           <p:cNvSpPr>
             <a:spLocks noGrp="1"/>
           </p:cNvSpPr>
           <p:nvPr>
-            <p:ph type="ftr" sz="quarter" idx="11"/>
+            <p:ph type="sldNum" sz="quarter" idx="11"/>
           </p:nvPr>
         </p:nvSpPr>
         <p:spPr/>
         <p:txBody>
           <a:bodyPr/>
-          <a:lstStyle>
-            <a:lvl1pPr>
-              <a:defRPr/>
-            </a:lvl1pPr>
-          </a:lstStyle>
-          <a:p>
-            <a:endParaRPr lang="en-US"/>
-          </a:p>
-        </p:txBody>
-      </p:sp>
-      <p:sp>
-        <p:nvSpPr>
-          <p:cNvPr id="7" name="Slide Number Placeholder 6"/>
-          <p:cNvSpPr>
-            <a:spLocks noGrp="1"/>
-          </p:cNvSpPr>
-          <p:nvPr>
-            <p:ph type="sldNum" sz="quarter" idx="12"/>
-          </p:nvPr>
-        </p:nvSpPr>
-        <p:spPr/>
-        <p:txBody>
-          <a:bodyPr/>
-          <a:lstStyle>
-            <a:lvl1pPr>
-              <a:defRPr smtClean="0"/>
-            </a:lvl1pPr>
-          </a:lstStyle>
-          <a:p>
-            <a:fld id="{2B299760-8B6F-FB4A-8A38-29CD67D0D0AF}" type="slidenum">
-              <a:rPr lang="en-US"/>
+          <a:lstStyle/>
+          <a:p>
+            <a:fld id="{95FC67CD-6733-D04F-B9BE-AD105949F24E}" type="slidenum">
+              <a:rPr lang="en-US" smtClean="0"/>
               <a:pPr/>
               <a:t>‹#›</a:t>
             </a:fld>
-            <a:endParaRPr lang="en-US"/>
+            <a:endParaRPr lang="en-US" dirty="0"/>
           </a:p>
         </p:txBody>
       </p:sp>
     </p:spTree>
+    <p:extLst>
+      <p:ext uri="{BB962C8B-B14F-4D97-AF65-F5344CB8AC3E}">
+        <p14:creationId xmlns:p14="http://schemas.microsoft.com/office/powerpoint/2010/main" val="3946726038"/>
+      </p:ext>
+    </p:extLst>
   </p:cSld>
   <p:clrMapOvr>
     <a:masterClrMapping/>
@@ -3891,7 +3897,7 @@
 </file>
 
 <file path=ppt/slideMasters/slideMaster1.xml><?xml version="1.0" encoding="utf-8"?>
-<p:sldMaster xmlns:a="http://schemas.openxmlformats.org/drawingml/2006/main" xmlns:r="http://schemas.openxmlformats.org/officeDocument/2006/relationships" xmlns:p="http://schemas.openxmlformats.org/presentationml/2006/main">
+<p:sldMaster xmlns:a="http://schemas.openxmlformats.org/drawingml/2006/main" xmlns:r="http://schemas.openxmlformats.org/officeDocument/2006/relationships" xmlns:p="http://schemas.openxmlformats.org/presentationml/2006/main" preserve="1">
   <p:cSld>
     <p:bg>
       <p:bgPr>
@@ -4031,99 +4037,6 @@
       </p:sp>
       <p:sp>
         <p:nvSpPr>
-          <p:cNvPr id="1028" name="Rectangle 4"/>
-          <p:cNvSpPr>
-            <a:spLocks noGrp="1" noChangeArrowheads="1"/>
-          </p:cNvSpPr>
-          <p:nvPr>
-            <p:ph type="dt" sz="half" idx="2"/>
-          </p:nvPr>
-        </p:nvSpPr>
-        <p:spPr bwMode="auto">
-          <a:xfrm>
-            <a:off x="685800" y="6248400"/>
-            <a:ext cx="1905000" cy="457200"/>
-          </a:xfrm>
-          <a:prstGeom prst="rect">
-            <a:avLst/>
-          </a:prstGeom>
-          <a:noFill/>
-          <a:ln w="9525">
-            <a:noFill/>
-            <a:miter lim="800000"/>
-            <a:headEnd/>
-            <a:tailEnd/>
-          </a:ln>
-          <a:effectLst/>
-        </p:spPr>
-        <p:txBody>
-          <a:bodyPr vert="horz" wrap="square" lIns="91440" tIns="45720" rIns="91440" bIns="45720" numCol="1" anchor="t" anchorCtr="0" compatLnSpc="1">
-            <a:prstTxWarp prst="textNoShape">
-              <a:avLst/>
-            </a:prstTxWarp>
-          </a:bodyPr>
-          <a:lstStyle>
-            <a:lvl1pPr>
-              <a:defRPr sz="1400">
-                <a:latin typeface="Candara"/>
-                <a:cs typeface="Candara"/>
-              </a:defRPr>
-            </a:lvl1pPr>
-          </a:lstStyle>
-          <a:p>
-            <a:fld id="{95D4FCF1-00D3-4349-9138-876342D2529F}" type="datetime1">
-              <a:rPr lang="en-CA" smtClean="0"/>
-              <a:t>16-07-14</a:t>
-            </a:fld>
-            <a:endParaRPr lang="en-US" dirty="0"/>
-          </a:p>
-        </p:txBody>
-      </p:sp>
-      <p:sp>
-        <p:nvSpPr>
-          <p:cNvPr id="1029" name="Rectangle 5"/>
-          <p:cNvSpPr>
-            <a:spLocks noGrp="1" noChangeArrowheads="1"/>
-          </p:cNvSpPr>
-          <p:nvPr>
-            <p:ph type="ftr" sz="quarter" idx="3"/>
-          </p:nvPr>
-        </p:nvSpPr>
-        <p:spPr bwMode="auto">
-          <a:xfrm>
-            <a:off x="3124200" y="6248400"/>
-            <a:ext cx="2895600" cy="457200"/>
-          </a:xfrm>
-          <a:prstGeom prst="rect">
-            <a:avLst/>
-          </a:prstGeom>
-          <a:noFill/>
-          <a:ln w="9525">
-            <a:noFill/>
-            <a:miter lim="800000"/>
-            <a:headEnd/>
-            <a:tailEnd/>
-          </a:ln>
-          <a:effectLst/>
-        </p:spPr>
-        <p:txBody>
-          <a:bodyPr vert="horz" wrap="square" lIns="91440" tIns="45720" rIns="91440" bIns="45720" numCol="1" anchor="t" anchorCtr="0" compatLnSpc="1">
-            <a:prstTxWarp prst="textNoShape">
-              <a:avLst/>
-            </a:prstTxWarp>
-          </a:bodyPr>
-          <a:lstStyle>
-            <a:lvl1pPr algn="ctr">
-              <a:defRPr sz="1400"/>
-            </a:lvl1pPr>
-          </a:lstStyle>
-          <a:p>
-            <a:endParaRPr lang="en-US"/>
-          </a:p>
-        </p:txBody>
-      </p:sp>
-      <p:sp>
-        <p:nvSpPr>
           <p:cNvPr id="1030" name="Rectangle 6"/>
           <p:cNvSpPr>
             <a:spLocks noGrp="1" noChangeArrowheads="1"/>
@@ -4158,13 +4071,13 @@
           <a:lstStyle>
             <a:lvl1pPr algn="r">
               <a:defRPr sz="1400">
-                <a:latin typeface="Candara"/>
+                <a:latin typeface="+mn-lt"/>
                 <a:cs typeface="Candara"/>
               </a:defRPr>
             </a:lvl1pPr>
           </a:lstStyle>
           <a:p>
-            <a:fld id="{D8512D64-FEAA-BC43-A323-8C6D3B193ADD}" type="slidenum">
+            <a:fld id="{95FC67CD-6733-D04F-B9BE-AD105949F24E}" type="slidenum">
               <a:rPr lang="en-US" smtClean="0"/>
               <a:pPr/>
               <a:t>‹#›</a:t>
@@ -4173,21 +4086,69 @@
           </a:p>
         </p:txBody>
       </p:sp>
+      <p:sp>
+        <p:nvSpPr>
+          <p:cNvPr id="2" name="Footer Placeholder 1">
+            <a:extLst>
+              <a:ext uri="{FF2B5EF4-FFF2-40B4-BE49-F238E27FC236}">
+                <a16:creationId xmlns:a16="http://schemas.microsoft.com/office/drawing/2014/main" id="{20CEA516-DB0A-A54B-8590-B485BCFD422E}"/>
+              </a:ext>
+            </a:extLst>
+          </p:cNvPr>
+          <p:cNvSpPr>
+            <a:spLocks noGrp="1"/>
+          </p:cNvSpPr>
+          <p:nvPr>
+            <p:ph type="ftr" sz="quarter" idx="3"/>
+          </p:nvPr>
+        </p:nvSpPr>
+        <p:spPr>
+          <a:xfrm>
+            <a:off x="3028950" y="6356350"/>
+            <a:ext cx="3086100" cy="365125"/>
+          </a:xfrm>
+          <a:prstGeom prst="rect">
+            <a:avLst/>
+          </a:prstGeom>
+        </p:spPr>
+        <p:txBody>
+          <a:bodyPr vert="horz" lIns="91440" tIns="45720" rIns="91440" bIns="45720" rtlCol="0" anchor="ctr"/>
+          <a:lstStyle>
+            <a:lvl1pPr algn="ctr">
+              <a:defRPr sz="1200">
+                <a:solidFill>
+                  <a:schemeClr val="tx1">
+                    <a:tint val="75000"/>
+                  </a:schemeClr>
+                </a:solidFill>
+              </a:defRPr>
+            </a:lvl1pPr>
+          </a:lstStyle>
+          <a:p>
+            <a:endParaRPr lang="en-US"/>
+          </a:p>
+        </p:txBody>
+      </p:sp>
     </p:spTree>
+    <p:extLst>
+      <p:ext uri="{BB962C8B-B14F-4D97-AF65-F5344CB8AC3E}">
+        <p14:creationId xmlns:p14="http://schemas.microsoft.com/office/powerpoint/2010/main" val="4135633605"/>
+      </p:ext>
+    </p:extLst>
   </p:cSld>
   <p:clrMap bg1="lt1" tx1="dk1" bg2="lt2" tx2="dk2" accent1="accent1" accent2="accent2" accent3="accent3" accent4="accent4" accent5="accent5" accent6="accent6" hlink="hlink" folHlink="folHlink"/>
   <p:sldLayoutIdLst>
-    <p:sldLayoutId id="2147483649" r:id="rId1"/>
-    <p:sldLayoutId id="2147483650" r:id="rId2"/>
-    <p:sldLayoutId id="2147483651" r:id="rId3"/>
-    <p:sldLayoutId id="2147483652" r:id="rId4"/>
-    <p:sldLayoutId id="2147483653" r:id="rId5"/>
-    <p:sldLayoutId id="2147483654" r:id="rId6"/>
-    <p:sldLayoutId id="2147483655" r:id="rId7"/>
-    <p:sldLayoutId id="2147483656" r:id="rId8"/>
-    <p:sldLayoutId id="2147483657" r:id="rId9"/>
-    <p:sldLayoutId id="2147483658" r:id="rId10"/>
-    <p:sldLayoutId id="2147483659" r:id="rId11"/>
+    <p:sldLayoutId id="2147483661" r:id="rId1"/>
+    <p:sldLayoutId id="2147483662" r:id="rId2"/>
+    <p:sldLayoutId id="2147483663" r:id="rId3"/>
+    <p:sldLayoutId id="2147483664" r:id="rId4"/>
+    <p:sldLayoutId id="2147483665" r:id="rId5"/>
+    <p:sldLayoutId id="2147483666" r:id="rId6"/>
+    <p:sldLayoutId id="2147483667" r:id="rId7"/>
+    <p:sldLayoutId id="2147483668" r:id="rId8"/>
+    <p:sldLayoutId id="2147483669" r:id="rId9"/>
+    <p:sldLayoutId id="2147483670" r:id="rId10"/>
+    <p:sldLayoutId id="2147483671" r:id="rId11"/>
   </p:sldLayoutIdLst>
   <p:hf hdr="0" ftr="0" dt="0"/>
   <p:txStyles>
@@ -4203,7 +4164,7 @@
           <a:solidFill>
             <a:schemeClr val="tx2"/>
           </a:solidFill>
-          <a:latin typeface="Candara"/>
+          <a:latin typeface="+mj-lt"/>
           <a:ea typeface="+mj-ea"/>
           <a:cs typeface="Candara"/>
         </a:defRPr>
@@ -4334,7 +4295,7 @@
           <a:solidFill>
             <a:schemeClr val="tx1"/>
           </a:solidFill>
-          <a:latin typeface="Candara"/>
+          <a:latin typeface="+mn-lt"/>
           <a:ea typeface="+mn-ea"/>
           <a:cs typeface="Candara"/>
         </a:defRPr>
@@ -4351,7 +4312,7 @@
           <a:solidFill>
             <a:schemeClr val="tx1"/>
           </a:solidFill>
-          <a:latin typeface="Candara"/>
+          <a:latin typeface="+mn-lt"/>
           <a:ea typeface="ＭＳ Ｐゴシック" charset="-128"/>
           <a:cs typeface="Candara"/>
         </a:defRPr>
@@ -4368,7 +4329,7 @@
           <a:solidFill>
             <a:schemeClr val="tx1"/>
           </a:solidFill>
-          <a:latin typeface="Candara"/>
+          <a:latin typeface="+mn-lt"/>
           <a:ea typeface="ＭＳ Ｐゴシック" charset="-128"/>
           <a:cs typeface="Candara"/>
         </a:defRPr>
@@ -4385,7 +4346,7 @@
           <a:solidFill>
             <a:schemeClr val="tx1"/>
           </a:solidFill>
-          <a:latin typeface="Candara"/>
+          <a:latin typeface="+mn-lt"/>
           <a:ea typeface="ＭＳ Ｐゴシック" charset="-128"/>
           <a:cs typeface="Candara"/>
         </a:defRPr>
@@ -4402,7 +4363,7 @@
           <a:solidFill>
             <a:schemeClr val="tx1"/>
           </a:solidFill>
-          <a:latin typeface="Candara"/>
+          <a:latin typeface="+mn-lt"/>
           <a:ea typeface="ＭＳ Ｐゴシック" charset="-128"/>
           <a:cs typeface="Candara"/>
         </a:defRPr>
@@ -4623,7 +4584,7 @@
               </a:spcBef>
             </a:pPr>
             <a:r>
-              <a:rPr lang="en-US" dirty="0" smtClean="0">
+              <a:rPr lang="en-US" dirty="0">
                 <a:solidFill>
                   <a:schemeClr val="dk1"/>
                 </a:solidFill>
@@ -4634,15 +4595,6 @@
               </a:rPr>
               <a:t>Static Single Assignment Form</a:t>
             </a:r>
-            <a:endParaRPr lang="en-US" dirty="0">
-              <a:solidFill>
-                <a:schemeClr val="dk1"/>
-              </a:solidFill>
-              <a:latin typeface="Calibri"/>
-              <a:ea typeface="Calibri"/>
-              <a:cs typeface="Calibri"/>
-              <a:sym typeface="Calibri"/>
-            </a:endParaRPr>
           </a:p>
         </p:txBody>
       </p:sp>
@@ -4751,6 +4703,30 @@
               </a:rPr>
               <a:t>anoopsarkar.github.io/compilers-class</a:t>
             </a:r>
+          </a:p>
+        </p:txBody>
+      </p:sp>
+      <p:sp>
+        <p:nvSpPr>
+          <p:cNvPr id="2" name="Slide Number Placeholder 1"/>
+          <p:cNvSpPr>
+            <a:spLocks noGrp="1"/>
+          </p:cNvSpPr>
+          <p:nvPr>
+            <p:ph type="sldNum" sz="quarter" idx="11"/>
+          </p:nvPr>
+        </p:nvSpPr>
+        <p:spPr/>
+        <p:txBody>
+          <a:bodyPr/>
+          <a:lstStyle/>
+          <a:p>
+            <a:fld id="{00632DF9-8F59-3B48-8E00-329792CA07DF}" type="slidenum">
+              <a:rPr lang="en-US" smtClean="0"/>
+              <a:pPr/>
+              <a:t>1</a:t>
+            </a:fld>
+            <a:endParaRPr lang="en-US"/>
           </a:p>
         </p:txBody>
       </p:sp>
@@ -4801,7 +4777,7 @@
               <a:buNone/>
             </a:pPr>
             <a:r>
-              <a:rPr lang="en-US" sz="2400" dirty="0" smtClean="0">
+              <a:rPr lang="en-US" sz="2400" dirty="0">
                 <a:solidFill>
                   <a:schemeClr val="dk1"/>
                 </a:solidFill>
@@ -4812,39 +4788,6 @@
               </a:rPr>
               <a:t>SSA Form 1</a:t>
             </a:r>
-            <a:endParaRPr lang="en-US" sz="2400" dirty="0">
-              <a:solidFill>
-                <a:schemeClr val="dk1"/>
-              </a:solidFill>
-              <a:latin typeface="Calibri"/>
-              <a:ea typeface="Calibri"/>
-              <a:cs typeface="Calibri"/>
-              <a:sym typeface="Calibri"/>
-            </a:endParaRPr>
-          </a:p>
-        </p:txBody>
-      </p:sp>
-      <p:sp>
-        <p:nvSpPr>
-          <p:cNvPr id="2" name="Slide Number Placeholder 1"/>
-          <p:cNvSpPr>
-            <a:spLocks noGrp="1"/>
-          </p:cNvSpPr>
-          <p:nvPr>
-            <p:ph type="sldNum" sz="quarter" idx="12"/>
-          </p:nvPr>
-        </p:nvSpPr>
-        <p:spPr/>
-        <p:txBody>
-          <a:bodyPr/>
-          <a:lstStyle/>
-          <a:p>
-            <a:fld id="{00632DF9-8F59-3B48-8E00-329792CA07DF}" type="slidenum">
-              <a:rPr lang="en-US" smtClean="0"/>
-              <a:pPr/>
-              <a:t>1</a:t>
-            </a:fld>
-            <a:endParaRPr lang="en-US"/>
           </a:p>
         </p:txBody>
       </p:sp>
@@ -4858,13 +4801,6 @@
   <p:clrMapOvr>
     <a:masterClrMapping/>
   </p:clrMapOvr>
-  <p:timing>
-    <p:tnLst>
-      <p:par>
-        <p:cTn xmlns:p14="http://schemas.microsoft.com/office/powerpoint/2010/main" id="1" dur="indefinite" restart="never" nodeType="tmRoot"/>
-      </p:par>
-    </p:tnLst>
-  </p:timing>
 </p:sld>
 </file>
 
@@ -4887,12 +4823,145 @@
       </p:grpSpPr>
       <p:sp>
         <p:nvSpPr>
+          <p:cNvPr id="164866" name="Rectangle 2"/>
+          <p:cNvSpPr>
+            <a:spLocks noGrp="1" noChangeArrowheads="1"/>
+          </p:cNvSpPr>
+          <p:nvPr>
+            <p:ph type="title"/>
+          </p:nvPr>
+        </p:nvSpPr>
+        <p:spPr/>
+        <p:txBody>
+          <a:bodyPr/>
+          <a:lstStyle/>
+          <a:p>
+            <a:r>
+              <a:rPr lang="en-US"/>
+              <a:t>Control Flow Graph (CFG)</a:t>
+            </a:r>
+          </a:p>
+        </p:txBody>
+      </p:sp>
+      <p:sp>
+        <p:nvSpPr>
+          <p:cNvPr id="164867" name="Rectangle 3"/>
+          <p:cNvSpPr>
+            <a:spLocks noGrp="1" noChangeArrowheads="1"/>
+          </p:cNvSpPr>
+          <p:nvPr>
+            <p:ph sz="half" idx="1"/>
+          </p:nvPr>
+        </p:nvSpPr>
+        <p:spPr>
+          <a:xfrm>
+            <a:off x="609600" y="2057400"/>
+            <a:ext cx="3657600" cy="4114800"/>
+          </a:xfrm>
+        </p:spPr>
+        <p:txBody>
+          <a:bodyPr/>
+          <a:lstStyle/>
+          <a:p>
+            <a:pPr>
+              <a:buFontTx/>
+              <a:buNone/>
+            </a:pPr>
+            <a:r>
+              <a:rPr lang="en-US" sz="2000" b="1"/>
+              <a:t>int main() {</a:t>
+            </a:r>
+          </a:p>
+          <a:p>
+            <a:pPr>
+              <a:buFontTx/>
+              <a:buNone/>
+            </a:pPr>
+            <a:r>
+              <a:rPr lang="en-US" sz="2000" b="1"/>
+              <a:t> extern int f(int);</a:t>
+            </a:r>
+          </a:p>
+          <a:p>
+            <a:pPr>
+              <a:buFontTx/>
+              <a:buNone/>
+            </a:pPr>
+            <a:r>
+              <a:rPr lang="en-US" sz="2000" b="1"/>
+              <a:t> int i;</a:t>
+            </a:r>
+          </a:p>
+          <a:p>
+            <a:pPr>
+              <a:buFontTx/>
+              <a:buNone/>
+            </a:pPr>
+            <a:r>
+              <a:rPr lang="en-US" sz="2000" b="1"/>
+              <a:t> int *a;</a:t>
+            </a:r>
+          </a:p>
+          <a:p>
+            <a:pPr>
+              <a:buFontTx/>
+              <a:buNone/>
+            </a:pPr>
+            <a:r>
+              <a:rPr lang="en-US" sz="2000" b="1"/>
+              <a:t> for (i = 0; </a:t>
+            </a:r>
+          </a:p>
+          <a:p>
+            <a:pPr>
+              <a:buFontTx/>
+              <a:buNone/>
+            </a:pPr>
+            <a:r>
+              <a:rPr lang="en-US" sz="2000" b="1"/>
+              <a:t>	    i &lt; 10;</a:t>
+            </a:r>
+          </a:p>
+          <a:p>
+            <a:pPr>
+              <a:buFontTx/>
+              <a:buNone/>
+            </a:pPr>
+            <a:r>
+              <a:rPr lang="en-US" sz="2000" b="1"/>
+              <a:t>		i = i + 1) </a:t>
+            </a:r>
+          </a:p>
+          <a:p>
+            <a:pPr>
+              <a:buFontTx/>
+              <a:buNone/>
+            </a:pPr>
+            <a:r>
+              <a:rPr lang="en-US" sz="2000" b="1"/>
+              <a:t>	{ a[i] = f(i); }</a:t>
+            </a:r>
+          </a:p>
+          <a:p>
+            <a:pPr>
+              <a:buFontTx/>
+              <a:buNone/>
+            </a:pPr>
+            <a:r>
+              <a:rPr lang="en-US" sz="2000" b="1"/>
+              <a:t>}</a:t>
+            </a:r>
+          </a:p>
+        </p:txBody>
+      </p:sp>
+      <p:sp>
+        <p:nvSpPr>
           <p:cNvPr id="20" name="Slide Number Placeholder 6"/>
           <p:cNvSpPr>
             <a:spLocks noGrp="1"/>
           </p:cNvSpPr>
           <p:nvPr>
-            <p:ph type="sldNum" sz="quarter" idx="12"/>
+            <p:ph type="sldNum" sz="quarter" idx="11"/>
           </p:nvPr>
         </p:nvSpPr>
         <p:spPr/>
@@ -4906,139 +4975,6 @@
               <a:t>2</a:t>
             </a:fld>
             <a:endParaRPr lang="en-US"/>
-          </a:p>
-        </p:txBody>
-      </p:sp>
-      <p:sp>
-        <p:nvSpPr>
-          <p:cNvPr id="164866" name="Rectangle 2"/>
-          <p:cNvSpPr>
-            <a:spLocks noGrp="1" noChangeArrowheads="1"/>
-          </p:cNvSpPr>
-          <p:nvPr>
-            <p:ph type="title"/>
-          </p:nvPr>
-        </p:nvSpPr>
-        <p:spPr/>
-        <p:txBody>
-          <a:bodyPr/>
-          <a:lstStyle/>
-          <a:p>
-            <a:r>
-              <a:rPr lang="en-US"/>
-              <a:t>Control Flow Graph (CFG)</a:t>
-            </a:r>
-          </a:p>
-        </p:txBody>
-      </p:sp>
-      <p:sp>
-        <p:nvSpPr>
-          <p:cNvPr id="164867" name="Rectangle 3"/>
-          <p:cNvSpPr>
-            <a:spLocks noGrp="1" noChangeArrowheads="1"/>
-          </p:cNvSpPr>
-          <p:nvPr>
-            <p:ph type="body" sz="half" idx="1"/>
-          </p:nvPr>
-        </p:nvSpPr>
-        <p:spPr>
-          <a:xfrm>
-            <a:off x="609600" y="2057400"/>
-            <a:ext cx="3657600" cy="4114800"/>
-          </a:xfrm>
-        </p:spPr>
-        <p:txBody>
-          <a:bodyPr/>
-          <a:lstStyle/>
-          <a:p>
-            <a:pPr>
-              <a:buFontTx/>
-              <a:buNone/>
-            </a:pPr>
-            <a:r>
-              <a:rPr lang="en-US" sz="2000" b="1"/>
-              <a:t>int main() {</a:t>
-            </a:r>
-          </a:p>
-          <a:p>
-            <a:pPr>
-              <a:buFontTx/>
-              <a:buNone/>
-            </a:pPr>
-            <a:r>
-              <a:rPr lang="en-US" sz="2000" b="1"/>
-              <a:t> extern int f(int);</a:t>
-            </a:r>
-          </a:p>
-          <a:p>
-            <a:pPr>
-              <a:buFontTx/>
-              <a:buNone/>
-            </a:pPr>
-            <a:r>
-              <a:rPr lang="en-US" sz="2000" b="1"/>
-              <a:t> int i;</a:t>
-            </a:r>
-          </a:p>
-          <a:p>
-            <a:pPr>
-              <a:buFontTx/>
-              <a:buNone/>
-            </a:pPr>
-            <a:r>
-              <a:rPr lang="en-US" sz="2000" b="1"/>
-              <a:t> int *a;</a:t>
-            </a:r>
-          </a:p>
-          <a:p>
-            <a:pPr>
-              <a:buFontTx/>
-              <a:buNone/>
-            </a:pPr>
-            <a:r>
-              <a:rPr lang="en-US" sz="2000" b="1"/>
-              <a:t> for (i = 0; </a:t>
-            </a:r>
-          </a:p>
-          <a:p>
-            <a:pPr>
-              <a:buFontTx/>
-              <a:buNone/>
-            </a:pPr>
-            <a:r>
-              <a:rPr lang="en-US" sz="2000" b="1"/>
-              <a:t>	    i &lt; 10;</a:t>
-            </a:r>
-          </a:p>
-          <a:p>
-            <a:pPr>
-              <a:buFontTx/>
-              <a:buNone/>
-            </a:pPr>
-            <a:r>
-              <a:rPr lang="en-US" sz="2000" b="1"/>
-              <a:t>		i = i + 1) </a:t>
-            </a:r>
-          </a:p>
-          <a:p>
-            <a:pPr>
-              <a:buFontTx/>
-              <a:buNone/>
-            </a:pPr>
-            <a:r>
-              <a:rPr lang="en-US" sz="2000" b="1"/>
-              <a:t>	{ a[i] = f(i); }</a:t>
-            </a:r>
-          </a:p>
-          <a:p>
-            <a:pPr>
-              <a:buFontTx/>
-              <a:buNone/>
-            </a:pPr>
-            <a:r>
-              <a:rPr lang="en-US" sz="2000" b="1"/>
-              <a:t>}</a:t>
-            </a:r>
           </a:p>
         </p:txBody>
       </p:sp>
@@ -5597,13 +5533,6 @@
   <p:clrMapOvr>
     <a:masterClrMapping/>
   </p:clrMapOvr>
-  <p:timing>
-    <p:tnLst>
-      <p:par>
-        <p:cTn xmlns:p14="http://schemas.microsoft.com/office/powerpoint/2010/main" id="1" dur="indefinite" restart="never" nodeType="tmRoot"/>
-      </p:par>
-    </p:tnLst>
-  </p:timing>
 </p:sld>
 </file>
 
@@ -5626,30 +5555,6 @@
       </p:grpSpPr>
       <p:sp>
         <p:nvSpPr>
-          <p:cNvPr id="21" name="Slide Number Placeholder 6"/>
-          <p:cNvSpPr>
-            <a:spLocks noGrp="1"/>
-          </p:cNvSpPr>
-          <p:nvPr>
-            <p:ph type="sldNum" sz="quarter" idx="12"/>
-          </p:nvPr>
-        </p:nvSpPr>
-        <p:spPr/>
-        <p:txBody>
-          <a:bodyPr/>
-          <a:lstStyle/>
-          <a:p>
-            <a:fld id="{F7B58F42-20DC-E744-8160-AF8385B66E2C}" type="slidenum">
-              <a:rPr lang="en-US"/>
-              <a:pPr/>
-              <a:t>3</a:t>
-            </a:fld>
-            <a:endParaRPr lang="en-US"/>
-          </a:p>
-        </p:txBody>
-      </p:sp>
-      <p:sp>
-        <p:nvSpPr>
           <p:cNvPr id="165890" name="Rectangle 2"/>
           <p:cNvSpPr>
             <a:spLocks noGrp="1" noChangeArrowheads="1"/>
@@ -5682,7 +5587,7 @@
             <a:spLocks noGrp="1" noChangeArrowheads="1"/>
           </p:cNvSpPr>
           <p:nvPr>
-            <p:ph type="body" sz="half" idx="2"/>
+            <p:ph sz="half" idx="1"/>
           </p:nvPr>
         </p:nvSpPr>
         <p:spPr>
@@ -5927,6 +5832,30 @@
               <a:rPr lang="en-US" sz="1600" b="1"/>
               <a:t>    return</a:t>
             </a:r>
+          </a:p>
+        </p:txBody>
+      </p:sp>
+      <p:sp>
+        <p:nvSpPr>
+          <p:cNvPr id="21" name="Slide Number Placeholder 6"/>
+          <p:cNvSpPr>
+            <a:spLocks noGrp="1"/>
+          </p:cNvSpPr>
+          <p:nvPr>
+            <p:ph type="sldNum" sz="quarter" idx="11"/>
+          </p:nvPr>
+        </p:nvSpPr>
+        <p:spPr/>
+        <p:txBody>
+          <a:bodyPr/>
+          <a:lstStyle/>
+          <a:p>
+            <a:fld id="{F7B58F42-20DC-E744-8160-AF8385B66E2C}" type="slidenum">
+              <a:rPr lang="en-US"/>
+              <a:pPr/>
+              <a:t>3</a:t>
+            </a:fld>
+            <a:endParaRPr lang="en-US"/>
           </a:p>
         </p:txBody>
       </p:sp>
@@ -6731,7 +6660,7 @@
   <p:timing>
     <p:tnLst>
       <p:par>
-        <p:cTn xmlns:p14="http://schemas.microsoft.com/office/powerpoint/2010/main" id="1" dur="indefinite" restart="never" nodeType="tmRoot">
+        <p:cTn id="1" dur="indefinite" restart="never" nodeType="tmRoot">
           <p:childTnLst>
             <p:seq concurrent="1" nextAc="seek">
               <p:cTn id="2" dur="indefinite" nodeType="mainSeq">
@@ -7012,6 +6941,92 @@
       </p:grpSpPr>
       <p:sp>
         <p:nvSpPr>
+          <p:cNvPr id="211970" name="Rectangle 2"/>
+          <p:cNvSpPr>
+            <a:spLocks noGrp="1" noChangeArrowheads="1"/>
+          </p:cNvSpPr>
+          <p:nvPr>
+            <p:ph type="title"/>
+          </p:nvPr>
+        </p:nvSpPr>
+        <p:spPr/>
+        <p:txBody>
+          <a:bodyPr/>
+          <a:lstStyle/>
+          <a:p>
+            <a:r>
+              <a:rPr lang="en-US"/>
+              <a:t>SSA Form</a:t>
+            </a:r>
+          </a:p>
+        </p:txBody>
+      </p:sp>
+      <p:sp>
+        <p:nvSpPr>
+          <p:cNvPr id="211971" name="Rectangle 3"/>
+          <p:cNvSpPr>
+            <a:spLocks noGrp="1" noChangeArrowheads="1"/>
+          </p:cNvSpPr>
+          <p:nvPr>
+            <p:ph idx="1"/>
+          </p:nvPr>
+        </p:nvSpPr>
+        <p:spPr/>
+        <p:txBody>
+          <a:bodyPr/>
+          <a:lstStyle/>
+          <a:p>
+            <a:pPr>
+              <a:lnSpc>
+                <a:spcPct val="90000"/>
+              </a:lnSpc>
+            </a:pPr>
+            <a:r>
+              <a:rPr lang="en-US" i="1"/>
+              <a:t>def-use</a:t>
+            </a:r>
+            <a:r>
+              <a:rPr lang="en-US"/>
+              <a:t> chains keep track of where variables were defined and where they were used</a:t>
+            </a:r>
+          </a:p>
+          <a:p>
+            <a:pPr>
+              <a:lnSpc>
+                <a:spcPct val="90000"/>
+              </a:lnSpc>
+            </a:pPr>
+            <a:r>
+              <a:rPr lang="en-US"/>
+              <a:t>Consider the case where each variable has only one definition in the intermediate representation</a:t>
+            </a:r>
+          </a:p>
+          <a:p>
+            <a:pPr>
+              <a:lnSpc>
+                <a:spcPct val="90000"/>
+              </a:lnSpc>
+            </a:pPr>
+            <a:r>
+              <a:rPr lang="en-US"/>
+              <a:t>One static definition, accessed many times</a:t>
+            </a:r>
+          </a:p>
+          <a:p>
+            <a:pPr>
+              <a:lnSpc>
+                <a:spcPct val="90000"/>
+              </a:lnSpc>
+            </a:pPr>
+            <a:r>
+              <a:rPr lang="en-US"/>
+              <a:t>Static Single Assignment Form (SSA)</a:t>
+            </a:r>
+          </a:p>
+        </p:txBody>
+      </p:sp>
+      <p:sp>
+        <p:nvSpPr>
           <p:cNvPr id="5" name="Slide Number Placeholder 5"/>
           <p:cNvSpPr>
             <a:spLocks noGrp="1"/>
@@ -7034,104 +7049,11 @@
           </a:p>
         </p:txBody>
       </p:sp>
-      <p:sp>
-        <p:nvSpPr>
-          <p:cNvPr id="211970" name="Rectangle 2"/>
-          <p:cNvSpPr>
-            <a:spLocks noGrp="1" noChangeArrowheads="1"/>
-          </p:cNvSpPr>
-          <p:nvPr>
-            <p:ph type="title"/>
-          </p:nvPr>
-        </p:nvSpPr>
-        <p:spPr/>
-        <p:txBody>
-          <a:bodyPr/>
-          <a:lstStyle/>
-          <a:p>
-            <a:r>
-              <a:rPr lang="en-US"/>
-              <a:t>SSA Form</a:t>
-            </a:r>
-          </a:p>
-        </p:txBody>
-      </p:sp>
-      <p:sp>
-        <p:nvSpPr>
-          <p:cNvPr id="211971" name="Rectangle 3"/>
-          <p:cNvSpPr>
-            <a:spLocks noGrp="1" noChangeArrowheads="1"/>
-          </p:cNvSpPr>
-          <p:nvPr>
-            <p:ph type="body" idx="1"/>
-          </p:nvPr>
-        </p:nvSpPr>
-        <p:spPr/>
-        <p:txBody>
-          <a:bodyPr/>
-          <a:lstStyle/>
-          <a:p>
-            <a:pPr>
-              <a:lnSpc>
-                <a:spcPct val="90000"/>
-              </a:lnSpc>
-            </a:pPr>
-            <a:r>
-              <a:rPr lang="en-US" i="1"/>
-              <a:t>def-use</a:t>
-            </a:r>
-            <a:r>
-              <a:rPr lang="en-US"/>
-              <a:t> chains keep track of where variables were defined and where they were used</a:t>
-            </a:r>
-          </a:p>
-          <a:p>
-            <a:pPr>
-              <a:lnSpc>
-                <a:spcPct val="90000"/>
-              </a:lnSpc>
-            </a:pPr>
-            <a:r>
-              <a:rPr lang="en-US"/>
-              <a:t>Consider the case where each variable has only one definition in the intermediate representation</a:t>
-            </a:r>
-          </a:p>
-          <a:p>
-            <a:pPr>
-              <a:lnSpc>
-                <a:spcPct val="90000"/>
-              </a:lnSpc>
-            </a:pPr>
-            <a:r>
-              <a:rPr lang="en-US"/>
-              <a:t>One static definition, accessed many times</a:t>
-            </a:r>
-          </a:p>
-          <a:p>
-            <a:pPr>
-              <a:lnSpc>
-                <a:spcPct val="90000"/>
-              </a:lnSpc>
-            </a:pPr>
-            <a:r>
-              <a:rPr lang="en-US"/>
-              <a:t>Static Single Assignment Form (SSA)</a:t>
-            </a:r>
-          </a:p>
-        </p:txBody>
-      </p:sp>
     </p:spTree>
   </p:cSld>
   <p:clrMapOvr>
     <a:masterClrMapping/>
   </p:clrMapOvr>
-  <p:timing>
-    <p:tnLst>
-      <p:par>
-        <p:cTn xmlns:p14="http://schemas.microsoft.com/office/powerpoint/2010/main" id="1" dur="indefinite" restart="never" nodeType="tmRoot"/>
-      </p:par>
-    </p:tnLst>
-  </p:timing>
 </p:sld>
 </file>
 
@@ -7154,6 +7076,99 @@
       </p:grpSpPr>
       <p:sp>
         <p:nvSpPr>
+          <p:cNvPr id="212994" name="Rectangle 2"/>
+          <p:cNvSpPr>
+            <a:spLocks noGrp="1" noChangeArrowheads="1"/>
+          </p:cNvSpPr>
+          <p:nvPr>
+            <p:ph type="title"/>
+          </p:nvPr>
+        </p:nvSpPr>
+        <p:spPr/>
+        <p:txBody>
+          <a:bodyPr/>
+          <a:lstStyle/>
+          <a:p>
+            <a:r>
+              <a:rPr lang="en-US"/>
+              <a:t>SSA Form</a:t>
+            </a:r>
+          </a:p>
+        </p:txBody>
+      </p:sp>
+      <p:sp>
+        <p:nvSpPr>
+          <p:cNvPr id="212995" name="Rectangle 3"/>
+          <p:cNvSpPr>
+            <a:spLocks noGrp="1" noChangeArrowheads="1"/>
+          </p:cNvSpPr>
+          <p:nvPr>
+            <p:ph idx="1"/>
+          </p:nvPr>
+        </p:nvSpPr>
+        <p:spPr/>
+        <p:txBody>
+          <a:bodyPr/>
+          <a:lstStyle/>
+          <a:p>
+            <a:pPr>
+              <a:lnSpc>
+                <a:spcPct val="90000"/>
+              </a:lnSpc>
+            </a:pPr>
+            <a:r>
+              <a:rPr lang="en-US"/>
+              <a:t>SSA is useful because</a:t>
+            </a:r>
+          </a:p>
+          <a:p>
+            <a:pPr lvl="1">
+              <a:lnSpc>
+                <a:spcPct val="90000"/>
+              </a:lnSpc>
+            </a:pPr>
+            <a:r>
+              <a:rPr lang="en-US"/>
+              <a:t>Dataflow analysis and optimization is simpler when each variable has only one definition</a:t>
+            </a:r>
+          </a:p>
+          <a:p>
+            <a:pPr lvl="1">
+              <a:lnSpc>
+                <a:spcPct val="90000"/>
+              </a:lnSpc>
+            </a:pPr>
+            <a:r>
+              <a:rPr lang="en-US"/>
+              <a:t>If a variable has N uses and M definitions (which use N+M instructions) it takes N*M to represent def-use chains</a:t>
+            </a:r>
+          </a:p>
+          <a:p>
+            <a:pPr lvl="1">
+              <a:lnSpc>
+                <a:spcPct val="90000"/>
+              </a:lnSpc>
+            </a:pPr>
+            <a:r>
+              <a:rPr lang="en-US"/>
+              <a:t>Complexity is the same for SSA but in practice it is usually linear in number of definitions</a:t>
+            </a:r>
+          </a:p>
+          <a:p>
+            <a:pPr lvl="1">
+              <a:lnSpc>
+                <a:spcPct val="90000"/>
+              </a:lnSpc>
+            </a:pPr>
+            <a:r>
+              <a:rPr lang="en-US"/>
+              <a:t>SSA simplifies the register interference graph</a:t>
+            </a:r>
+          </a:p>
+        </p:txBody>
+      </p:sp>
+      <p:sp>
+        <p:nvSpPr>
           <p:cNvPr id="5" name="Slide Number Placeholder 5"/>
           <p:cNvSpPr>
             <a:spLocks noGrp="1"/>
@@ -7176,111 +7191,11 @@
           </a:p>
         </p:txBody>
       </p:sp>
-      <p:sp>
-        <p:nvSpPr>
-          <p:cNvPr id="212994" name="Rectangle 2"/>
-          <p:cNvSpPr>
-            <a:spLocks noGrp="1" noChangeArrowheads="1"/>
-          </p:cNvSpPr>
-          <p:nvPr>
-            <p:ph type="title"/>
-          </p:nvPr>
-        </p:nvSpPr>
-        <p:spPr/>
-        <p:txBody>
-          <a:bodyPr/>
-          <a:lstStyle/>
-          <a:p>
-            <a:r>
-              <a:rPr lang="en-US"/>
-              <a:t>SSA Form</a:t>
-            </a:r>
-          </a:p>
-        </p:txBody>
-      </p:sp>
-      <p:sp>
-        <p:nvSpPr>
-          <p:cNvPr id="212995" name="Rectangle 3"/>
-          <p:cNvSpPr>
-            <a:spLocks noGrp="1" noChangeArrowheads="1"/>
-          </p:cNvSpPr>
-          <p:nvPr>
-            <p:ph type="body" idx="1"/>
-          </p:nvPr>
-        </p:nvSpPr>
-        <p:spPr/>
-        <p:txBody>
-          <a:bodyPr/>
-          <a:lstStyle/>
-          <a:p>
-            <a:pPr>
-              <a:lnSpc>
-                <a:spcPct val="90000"/>
-              </a:lnSpc>
-            </a:pPr>
-            <a:r>
-              <a:rPr lang="en-US"/>
-              <a:t>SSA is useful because</a:t>
-            </a:r>
-          </a:p>
-          <a:p>
-            <a:pPr lvl="1">
-              <a:lnSpc>
-                <a:spcPct val="90000"/>
-              </a:lnSpc>
-            </a:pPr>
-            <a:r>
-              <a:rPr lang="en-US"/>
-              <a:t>Dataflow analysis and optimization is simpler when each variable has only one definition</a:t>
-            </a:r>
-          </a:p>
-          <a:p>
-            <a:pPr lvl="1">
-              <a:lnSpc>
-                <a:spcPct val="90000"/>
-              </a:lnSpc>
-            </a:pPr>
-            <a:r>
-              <a:rPr lang="en-US"/>
-              <a:t>If a variable has N uses and M definitions (which use N+M instructions) it takes N*M to represent def-use chains</a:t>
-            </a:r>
-          </a:p>
-          <a:p>
-            <a:pPr lvl="1">
-              <a:lnSpc>
-                <a:spcPct val="90000"/>
-              </a:lnSpc>
-            </a:pPr>
-            <a:r>
-              <a:rPr lang="en-US"/>
-              <a:t>Complexity is the same for SSA but in practice it is usually linear in number of definitions</a:t>
-            </a:r>
-          </a:p>
-          <a:p>
-            <a:pPr lvl="1">
-              <a:lnSpc>
-                <a:spcPct val="90000"/>
-              </a:lnSpc>
-            </a:pPr>
-            <a:r>
-              <a:rPr lang="en-US"/>
-              <a:t>SSA simplifies the register interference graph</a:t>
-            </a:r>
-          </a:p>
-        </p:txBody>
-      </p:sp>
     </p:spTree>
   </p:cSld>
   <p:clrMapOvr>
     <a:masterClrMapping/>
   </p:clrMapOvr>
-  <p:timing>
-    <p:tnLst>
-      <p:par>
-        <p:cTn xmlns:p14="http://schemas.microsoft.com/office/powerpoint/2010/main" id="1" dur="indefinite" restart="never" nodeType="tmRoot"/>
-      </p:par>
-    </p:tnLst>
-  </p:timing>
 </p:sld>
 </file>
 
@@ -7303,12 +7218,192 @@
       </p:grpSpPr>
       <p:sp>
         <p:nvSpPr>
+          <p:cNvPr id="214018" name="Rectangle 2"/>
+          <p:cNvSpPr>
+            <a:spLocks noGrp="1" noChangeArrowheads="1"/>
+          </p:cNvSpPr>
+          <p:nvPr>
+            <p:ph type="title"/>
+          </p:nvPr>
+        </p:nvSpPr>
+        <p:spPr/>
+        <p:txBody>
+          <a:bodyPr/>
+          <a:lstStyle/>
+          <a:p>
+            <a:r>
+              <a:rPr lang="en-US"/>
+              <a:t>SSA Form</a:t>
+            </a:r>
+          </a:p>
+        </p:txBody>
+      </p:sp>
+      <p:sp>
+        <p:nvSpPr>
+          <p:cNvPr id="214019" name="Rectangle 3"/>
+          <p:cNvSpPr>
+            <a:spLocks noGrp="1" noChangeArrowheads="1"/>
+          </p:cNvSpPr>
+          <p:nvPr>
+            <p:ph sz="half" idx="1"/>
+          </p:nvPr>
+        </p:nvSpPr>
+        <p:spPr/>
+        <p:txBody>
+          <a:bodyPr/>
+          <a:lstStyle/>
+          <a:p>
+            <a:r>
+              <a:rPr lang="en-US"/>
+              <a:t>Original Program</a:t>
+            </a:r>
+          </a:p>
+          <a:p>
+            <a:pPr>
+              <a:buFontTx/>
+              <a:buNone/>
+            </a:pPr>
+            <a:endParaRPr lang="en-US"/>
+          </a:p>
+          <a:p>
+            <a:pPr>
+              <a:buFontTx/>
+              <a:buNone/>
+            </a:pPr>
+            <a:r>
+              <a:rPr lang="en-US"/>
+              <a:t>a := x + y</a:t>
+            </a:r>
+          </a:p>
+          <a:p>
+            <a:pPr>
+              <a:buFontTx/>
+              <a:buNone/>
+            </a:pPr>
+            <a:r>
+              <a:rPr lang="en-US"/>
+              <a:t>b := a - 1</a:t>
+            </a:r>
+          </a:p>
+          <a:p>
+            <a:pPr>
+              <a:buFontTx/>
+              <a:buNone/>
+            </a:pPr>
+            <a:r>
+              <a:rPr lang="en-US"/>
+              <a:t>a := y + b</a:t>
+            </a:r>
+          </a:p>
+          <a:p>
+            <a:pPr>
+              <a:buFontTx/>
+              <a:buNone/>
+            </a:pPr>
+            <a:r>
+              <a:rPr lang="en-US"/>
+              <a:t>b := x * 4</a:t>
+            </a:r>
+          </a:p>
+          <a:p>
+            <a:pPr>
+              <a:buFontTx/>
+              <a:buNone/>
+            </a:pPr>
+            <a:r>
+              <a:rPr lang="en-US"/>
+              <a:t>a := a + b</a:t>
+            </a:r>
+          </a:p>
+        </p:txBody>
+      </p:sp>
+      <p:sp>
+        <p:nvSpPr>
+          <p:cNvPr id="214020" name="Rectangle 4"/>
+          <p:cNvSpPr>
+            <a:spLocks noGrp="1" noChangeArrowheads="1"/>
+          </p:cNvSpPr>
+          <p:nvPr>
+            <p:ph sz="half" idx="2"/>
+          </p:nvPr>
+        </p:nvSpPr>
+        <p:spPr/>
+        <p:txBody>
+          <a:bodyPr/>
+          <a:lstStyle/>
+          <a:p>
+            <a:r>
+              <a:rPr lang="en-US"/>
+              <a:t>SSA Form</a:t>
+            </a:r>
+          </a:p>
+          <a:p>
+            <a:pPr>
+              <a:buFontTx/>
+              <a:buNone/>
+            </a:pPr>
+            <a:endParaRPr lang="en-US"/>
+          </a:p>
+          <a:p>
+            <a:pPr>
+              <a:buFontTx/>
+              <a:buNone/>
+            </a:pPr>
+            <a:r>
+              <a:rPr lang="en-US"/>
+              <a:t>a1 := x + y</a:t>
+            </a:r>
+          </a:p>
+          <a:p>
+            <a:pPr>
+              <a:buFontTx/>
+              <a:buNone/>
+            </a:pPr>
+            <a:r>
+              <a:rPr lang="en-US"/>
+              <a:t>b1 := a1 - 1</a:t>
+            </a:r>
+          </a:p>
+          <a:p>
+            <a:pPr>
+              <a:buFontTx/>
+              <a:buNone/>
+            </a:pPr>
+            <a:r>
+              <a:rPr lang="en-US"/>
+              <a:t>a2 := y + b1</a:t>
+            </a:r>
+          </a:p>
+          <a:p>
+            <a:pPr>
+              <a:buFontTx/>
+              <a:buNone/>
+            </a:pPr>
+            <a:r>
+              <a:rPr lang="en-US"/>
+              <a:t>b2 := x * 4</a:t>
+            </a:r>
+          </a:p>
+          <a:p>
+            <a:pPr>
+              <a:buFontTx/>
+              <a:buNone/>
+            </a:pPr>
+            <a:r>
+              <a:rPr lang="en-US"/>
+              <a:t>a3 := a2 + b2</a:t>
+            </a:r>
+          </a:p>
+        </p:txBody>
+      </p:sp>
+      <p:sp>
+        <p:nvSpPr>
           <p:cNvPr id="7" name="Slide Number Placeholder 6"/>
           <p:cNvSpPr>
             <a:spLocks noGrp="1"/>
           </p:cNvSpPr>
           <p:nvPr>
-            <p:ph type="sldNum" sz="quarter" idx="12"/>
+            <p:ph type="sldNum" sz="quarter" idx="11"/>
           </p:nvPr>
         </p:nvSpPr>
         <p:spPr/>
@@ -7322,186 +7417,6 @@
               <a:t>6</a:t>
             </a:fld>
             <a:endParaRPr lang="en-US"/>
-          </a:p>
-        </p:txBody>
-      </p:sp>
-      <p:sp>
-        <p:nvSpPr>
-          <p:cNvPr id="214018" name="Rectangle 2"/>
-          <p:cNvSpPr>
-            <a:spLocks noGrp="1" noChangeArrowheads="1"/>
-          </p:cNvSpPr>
-          <p:nvPr>
-            <p:ph type="title"/>
-          </p:nvPr>
-        </p:nvSpPr>
-        <p:spPr/>
-        <p:txBody>
-          <a:bodyPr/>
-          <a:lstStyle/>
-          <a:p>
-            <a:r>
-              <a:rPr lang="en-US"/>
-              <a:t>SSA Form</a:t>
-            </a:r>
-          </a:p>
-        </p:txBody>
-      </p:sp>
-      <p:sp>
-        <p:nvSpPr>
-          <p:cNvPr id="214019" name="Rectangle 3"/>
-          <p:cNvSpPr>
-            <a:spLocks noGrp="1" noChangeArrowheads="1"/>
-          </p:cNvSpPr>
-          <p:nvPr>
-            <p:ph type="body" sz="half" idx="1"/>
-          </p:nvPr>
-        </p:nvSpPr>
-        <p:spPr/>
-        <p:txBody>
-          <a:bodyPr/>
-          <a:lstStyle/>
-          <a:p>
-            <a:r>
-              <a:rPr lang="en-US"/>
-              <a:t>Original Program</a:t>
-            </a:r>
-          </a:p>
-          <a:p>
-            <a:pPr>
-              <a:buFontTx/>
-              <a:buNone/>
-            </a:pPr>
-            <a:endParaRPr lang="en-US"/>
-          </a:p>
-          <a:p>
-            <a:pPr>
-              <a:buFontTx/>
-              <a:buNone/>
-            </a:pPr>
-            <a:r>
-              <a:rPr lang="en-US"/>
-              <a:t>a := x + y</a:t>
-            </a:r>
-          </a:p>
-          <a:p>
-            <a:pPr>
-              <a:buFontTx/>
-              <a:buNone/>
-            </a:pPr>
-            <a:r>
-              <a:rPr lang="en-US"/>
-              <a:t>b := a - 1</a:t>
-            </a:r>
-          </a:p>
-          <a:p>
-            <a:pPr>
-              <a:buFontTx/>
-              <a:buNone/>
-            </a:pPr>
-            <a:r>
-              <a:rPr lang="en-US"/>
-              <a:t>a := y + b</a:t>
-            </a:r>
-          </a:p>
-          <a:p>
-            <a:pPr>
-              <a:buFontTx/>
-              <a:buNone/>
-            </a:pPr>
-            <a:r>
-              <a:rPr lang="en-US"/>
-              <a:t>b := x * 4</a:t>
-            </a:r>
-          </a:p>
-          <a:p>
-            <a:pPr>
-              <a:buFontTx/>
-              <a:buNone/>
-            </a:pPr>
-            <a:r>
-              <a:rPr lang="en-US"/>
-              <a:t>a := a + b</a:t>
-            </a:r>
-          </a:p>
-        </p:txBody>
-      </p:sp>
-      <p:sp>
-        <p:nvSpPr>
-          <p:cNvPr id="214020" name="Rectangle 4"/>
-          <p:cNvSpPr>
-            <a:spLocks noGrp="1" noChangeArrowheads="1"/>
-          </p:cNvSpPr>
-          <p:nvPr>
-            <p:ph type="body" sz="half" idx="2"/>
-          </p:nvPr>
-        </p:nvSpPr>
-        <p:spPr/>
-        <p:txBody>
-          <a:bodyPr/>
-          <a:lstStyle/>
-          <a:p>
-            <a:r>
-              <a:rPr lang="en-US"/>
-              <a:t>SSA Form</a:t>
-            </a:r>
-          </a:p>
-          <a:p>
-            <a:pPr>
-              <a:buFontTx/>
-              <a:buNone/>
-            </a:pPr>
-            <a:endParaRPr lang="en-US"/>
-          </a:p>
-          <a:p>
-            <a:pPr>
-              <a:buFontTx/>
-              <a:buNone/>
-            </a:pPr>
-            <a:r>
-              <a:rPr lang="en-US"/>
-              <a:t>a1 := x + y</a:t>
-            </a:r>
-          </a:p>
-          <a:p>
-            <a:pPr>
-              <a:buFontTx/>
-              <a:buNone/>
-            </a:pPr>
-            <a:r>
-              <a:rPr lang="en-US"/>
-              <a:t>b1 := a1 - 1</a:t>
-            </a:r>
-          </a:p>
-          <a:p>
-            <a:pPr>
-              <a:buFontTx/>
-              <a:buNone/>
-            </a:pPr>
-            <a:r>
-              <a:rPr lang="en-US"/>
-              <a:t>a2 := y + b1</a:t>
-            </a:r>
-          </a:p>
-          <a:p>
-            <a:pPr>
-              <a:buFontTx/>
-              <a:buNone/>
-            </a:pPr>
-            <a:r>
-              <a:rPr lang="en-US"/>
-              <a:t>b2 := x * 4</a:t>
-            </a:r>
-          </a:p>
-          <a:p>
-            <a:pPr>
-              <a:buFontTx/>
-              <a:buNone/>
-            </a:pPr>
-            <a:r>
-              <a:rPr lang="en-US"/>
-              <a:t>a3 := a2 + b2</a:t>
-            </a:r>
           </a:p>
         </p:txBody>
       </p:sp>
@@ -7554,7 +7469,7 @@
   <p:timing>
     <p:tnLst>
       <p:par>
-        <p:cTn xmlns:p14="http://schemas.microsoft.com/office/powerpoint/2010/main" id="1" dur="indefinite" restart="never" nodeType="tmRoot">
+        <p:cTn id="1" dur="indefinite" restart="never" nodeType="tmRoot">
           <p:childTnLst>
             <p:seq concurrent="1" nextAc="seek">
               <p:cTn id="2" dur="indefinite" nodeType="mainSeq">
@@ -7651,12 +7566,34 @@
       </p:grpSpPr>
       <p:sp>
         <p:nvSpPr>
+          <p:cNvPr id="216066" name="Rectangle 2"/>
+          <p:cNvSpPr>
+            <a:spLocks noGrp="1" noChangeArrowheads="1"/>
+          </p:cNvSpPr>
+          <p:nvPr>
+            <p:ph type="title"/>
+          </p:nvPr>
+        </p:nvSpPr>
+        <p:spPr/>
+        <p:txBody>
+          <a:bodyPr/>
+          <a:lstStyle/>
+          <a:p>
+            <a:r>
+              <a:rPr lang="en-US"/>
+              <a:t>SSA Form</a:t>
+            </a:r>
+          </a:p>
+        </p:txBody>
+      </p:sp>
+      <p:sp>
+        <p:nvSpPr>
           <p:cNvPr id="20" name="Slide Number Placeholder 4"/>
           <p:cNvSpPr>
             <a:spLocks noGrp="1"/>
           </p:cNvSpPr>
           <p:nvPr>
-            <p:ph type="sldNum" sz="quarter" idx="12"/>
+            <p:ph type="sldNum" sz="quarter" idx="11"/>
           </p:nvPr>
         </p:nvSpPr>
         <p:spPr/>
@@ -7670,28 +7607,6 @@
               <a:t>7</a:t>
             </a:fld>
             <a:endParaRPr lang="en-US"/>
-          </a:p>
-        </p:txBody>
-      </p:sp>
-      <p:sp>
-        <p:nvSpPr>
-          <p:cNvPr id="216066" name="Rectangle 2"/>
-          <p:cNvSpPr>
-            <a:spLocks noGrp="1" noChangeArrowheads="1"/>
-          </p:cNvSpPr>
-          <p:nvPr>
-            <p:ph type="title"/>
-          </p:nvPr>
-        </p:nvSpPr>
-        <p:spPr/>
-        <p:txBody>
-          <a:bodyPr/>
-          <a:lstStyle/>
-          <a:p>
-            <a:r>
-              <a:rPr lang="en-US"/>
-              <a:t>SSA Form</a:t>
-            </a:r>
           </a:p>
         </p:txBody>
       </p:sp>
@@ -8343,7 +8258,7 @@
   <p:timing>
     <p:tnLst>
       <p:par>
-        <p:cTn xmlns:p14="http://schemas.microsoft.com/office/powerpoint/2010/main" id="1" dur="indefinite" restart="never" nodeType="tmRoot">
+        <p:cTn id="1" dur="indefinite" restart="never" nodeType="tmRoot">
           <p:childTnLst>
             <p:seq concurrent="1" nextAc="seek">
               <p:cTn id="2" dur="indefinite" nodeType="mainSeq">
@@ -8437,12 +8352,34 @@
       </p:grpSpPr>
       <p:sp>
         <p:nvSpPr>
+          <p:cNvPr id="216066" name="Rectangle 2"/>
+          <p:cNvSpPr>
+            <a:spLocks noGrp="1" noChangeArrowheads="1"/>
+          </p:cNvSpPr>
+          <p:nvPr>
+            <p:ph type="title"/>
+          </p:nvPr>
+        </p:nvSpPr>
+        <p:spPr/>
+        <p:txBody>
+          <a:bodyPr/>
+          <a:lstStyle/>
+          <a:p>
+            <a:r>
+              <a:rPr lang="en-US" dirty="0"/>
+              <a:t>Edge-split SSA Form</a:t>
+            </a:r>
+          </a:p>
+        </p:txBody>
+      </p:sp>
+      <p:sp>
+        <p:nvSpPr>
           <p:cNvPr id="20" name="Slide Number Placeholder 4"/>
           <p:cNvSpPr>
             <a:spLocks noGrp="1"/>
           </p:cNvSpPr>
           <p:nvPr>
-            <p:ph type="sldNum" sz="quarter" idx="12"/>
+            <p:ph type="sldNum" sz="quarter" idx="11"/>
           </p:nvPr>
         </p:nvSpPr>
         <p:spPr/>
@@ -8456,32 +8393,6 @@
               <a:t>8</a:t>
             </a:fld>
             <a:endParaRPr lang="en-US"/>
-          </a:p>
-        </p:txBody>
-      </p:sp>
-      <p:sp>
-        <p:nvSpPr>
-          <p:cNvPr id="216066" name="Rectangle 2"/>
-          <p:cNvSpPr>
-            <a:spLocks noGrp="1" noChangeArrowheads="1"/>
-          </p:cNvSpPr>
-          <p:nvPr>
-            <p:ph type="title"/>
-          </p:nvPr>
-        </p:nvSpPr>
-        <p:spPr/>
-        <p:txBody>
-          <a:bodyPr/>
-          <a:lstStyle/>
-          <a:p>
-            <a:r>
-              <a:rPr lang="en-US" dirty="0" smtClean="0"/>
-              <a:t>Edge-split SSA </a:t>
-            </a:r>
-            <a:r>
-              <a:rPr lang="en-US" dirty="0"/>
-              <a:t>Form</a:t>
-            </a:r>
           </a:p>
         </p:txBody>
       </p:sp>
@@ -8927,13 +8838,8 @@
           <a:p>
             <a:r>
               <a:rPr lang="en-US" sz="2800" dirty="0"/>
-              <a:t>3: a2 :=</a:t>
-            </a:r>
-            <a:r>
-              <a:rPr lang="en-US" sz="2800" dirty="0" smtClean="0"/>
-              <a:t> b1</a:t>
-            </a:r>
-            <a:endParaRPr lang="en-US" sz="2800" dirty="0"/>
+              <a:t>3: a2 := b1</a:t>
+            </a:r>
           </a:p>
         </p:txBody>
       </p:sp>
@@ -9154,10 +9060,9 @@
           <a:lstStyle/>
           <a:p>
             <a:r>
-              <a:rPr lang="en-US" sz="2800" dirty="0" smtClean="0"/>
+              <a:rPr lang="en-US" sz="2800" dirty="0"/>
               <a:t>5:</a:t>
             </a:r>
-            <a:endParaRPr lang="en-US" sz="2800" dirty="0"/>
           </a:p>
         </p:txBody>
       </p:sp>
@@ -9219,28 +9124,28 @@
           <a:p>
             <a:pPr algn="ctr"/>
             <a:r>
-              <a:rPr lang="en-US" dirty="0" smtClean="0"/>
+              <a:rPr lang="en-US" dirty="0"/>
               <a:t>Unique</a:t>
             </a:r>
           </a:p>
           <a:p>
             <a:pPr algn="ctr"/>
             <a:r>
-              <a:rPr lang="en-US" dirty="0" smtClean="0"/>
+              <a:rPr lang="en-US" dirty="0"/>
               <a:t>Successor &amp;</a:t>
             </a:r>
           </a:p>
           <a:p>
             <a:pPr algn="ctr"/>
             <a:r>
-              <a:rPr lang="en-US" dirty="0" smtClean="0"/>
+              <a:rPr lang="en-US" dirty="0"/>
               <a:t>Unique</a:t>
             </a:r>
           </a:p>
           <a:p>
             <a:pPr algn="ctr"/>
             <a:r>
-              <a:rPr lang="en-US" dirty="0" smtClean="0"/>
+              <a:rPr lang="en-US" dirty="0"/>
               <a:t>Predecessor</a:t>
             </a:r>
           </a:p>
@@ -9251,18 +9156,11 @@
   <p:clrMapOvr>
     <a:masterClrMapping/>
   </p:clrMapOvr>
-  <p:timing>
-    <p:tnLst>
-      <p:par>
-        <p:cTn xmlns:p14="http://schemas.microsoft.com/office/powerpoint/2010/main" id="1" dur="indefinite" restart="never" nodeType="tmRoot"/>
-      </p:par>
-    </p:tnLst>
-  </p:timing>
 </p:sld>
 </file>
 
 <file path=ppt/theme/theme1.xml><?xml version="1.0" encoding="utf-8"?>
-<a:theme xmlns:a="http://schemas.openxmlformats.org/drawingml/2006/main" name="Blank Presentation">
+<a:theme xmlns:a="http://schemas.openxmlformats.org/drawingml/2006/main" name="1_Blank Presentation">
   <a:themeElements>
     <a:clrScheme name="Blank Presentation 1">
       <a:dk1>
@@ -9302,16 +9200,110 @@
         <a:srgbClr val="99CC00"/>
       </a:folHlink>
     </a:clrScheme>
-    <a:fontScheme name="Blank Presentation">
+    <a:fontScheme name="Office">
       <a:majorFont>
-        <a:latin typeface="Times"/>
+        <a:latin typeface="Calibri Light" panose="020F0302020204030204"/>
         <a:ea typeface=""/>
         <a:cs typeface=""/>
+        <a:font script="Jpan" typeface="游ゴシック Light"/>
+        <a:font script="Hang" typeface="맑은 고딕"/>
+        <a:font script="Hans" typeface="等线 Light"/>
+        <a:font script="Hant" typeface="新細明體"/>
+        <a:font script="Arab" typeface="Times New Roman"/>
+        <a:font script="Hebr" typeface="Times New Roman"/>
+        <a:font script="Thai" typeface="Angsana New"/>
+        <a:font script="Ethi" typeface="Nyala"/>
+        <a:font script="Beng" typeface="Vrinda"/>
+        <a:font script="Gujr" typeface="Shruti"/>
+        <a:font script="Khmr" typeface="MoolBoran"/>
+        <a:font script="Knda" typeface="Tunga"/>
+        <a:font script="Guru" typeface="Raavi"/>
+        <a:font script="Cans" typeface="Euphemia"/>
+        <a:font script="Cher" typeface="Plantagenet Cherokee"/>
+        <a:font script="Yiii" typeface="Microsoft Yi Baiti"/>
+        <a:font script="Tibt" typeface="Microsoft Himalaya"/>
+        <a:font script="Thaa" typeface="MV Boli"/>
+        <a:font script="Deva" typeface="Mangal"/>
+        <a:font script="Telu" typeface="Gautami"/>
+        <a:font script="Taml" typeface="Latha"/>
+        <a:font script="Syrc" typeface="Estrangelo Edessa"/>
+        <a:font script="Orya" typeface="Kalinga"/>
+        <a:font script="Mlym" typeface="Kartika"/>
+        <a:font script="Laoo" typeface="DokChampa"/>
+        <a:font script="Sinh" typeface="Iskoola Pota"/>
+        <a:font script="Mong" typeface="Mongolian Baiti"/>
+        <a:font script="Viet" typeface="Times New Roman"/>
+        <a:font script="Uigh" typeface="Microsoft Uighur"/>
+        <a:font script="Geor" typeface="Sylfaen"/>
+        <a:font script="Armn" typeface="Arial"/>
+        <a:font script="Bugi" typeface="Leelawadee UI"/>
+        <a:font script="Bopo" typeface="Microsoft JhengHei"/>
+        <a:font script="Java" typeface="Javanese Text"/>
+        <a:font script="Lisu" typeface="Segoe UI"/>
+        <a:font script="Mymr" typeface="Myanmar Text"/>
+        <a:font script="Nkoo" typeface="Ebrima"/>
+        <a:font script="Olck" typeface="Nirmala UI"/>
+        <a:font script="Osma" typeface="Ebrima"/>
+        <a:font script="Phag" typeface="Phagspa"/>
+        <a:font script="Syrn" typeface="Estrangelo Edessa"/>
+        <a:font script="Syrj" typeface="Estrangelo Edessa"/>
+        <a:font script="Syre" typeface="Estrangelo Edessa"/>
+        <a:font script="Sora" typeface="Nirmala UI"/>
+        <a:font script="Tale" typeface="Microsoft Tai Le"/>
+        <a:font script="Talu" typeface="Microsoft New Tai Lue"/>
+        <a:font script="Tfng" typeface="Ebrima"/>
       </a:majorFont>
       <a:minorFont>
-        <a:latin typeface="Times"/>
+        <a:latin typeface="Calibri" panose="020F0502020204030204"/>
         <a:ea typeface=""/>
         <a:cs typeface=""/>
+        <a:font script="Jpan" typeface="游ゴシック"/>
+        <a:font script="Hang" typeface="맑은 고딕"/>
+        <a:font script="Hans" typeface="等线"/>
+        <a:font script="Hant" typeface="新細明體"/>
+        <a:font script="Arab" typeface="Arial"/>
+        <a:font script="Hebr" typeface="Arial"/>
+        <a:font script="Thai" typeface="Cordia New"/>
+        <a:font script="Ethi" typeface="Nyala"/>
+        <a:font script="Beng" typeface="Vrinda"/>
+        <a:font script="Gujr" typeface="Shruti"/>
+        <a:font script="Khmr" typeface="DaunPenh"/>
+        <a:font script="Knda" typeface="Tunga"/>
+        <a:font script="Guru" typeface="Raavi"/>
+        <a:font script="Cans" typeface="Euphemia"/>
+        <a:font script="Cher" typeface="Plantagenet Cherokee"/>
+        <a:font script="Yiii" typeface="Microsoft Yi Baiti"/>
+        <a:font script="Tibt" typeface="Microsoft Himalaya"/>
+        <a:font script="Thaa" typeface="MV Boli"/>
+        <a:font script="Deva" typeface="Mangal"/>
+        <a:font script="Telu" typeface="Gautami"/>
+        <a:font script="Taml" typeface="Latha"/>
+        <a:font script="Syrc" typeface="Estrangelo Edessa"/>
+        <a:font script="Orya" typeface="Kalinga"/>
+        <a:font script="Mlym" typeface="Kartika"/>
+        <a:font script="Laoo" typeface="DokChampa"/>
+        <a:font script="Sinh" typeface="Iskoola Pota"/>
+        <a:font script="Mong" typeface="Mongolian Baiti"/>
+        <a:font script="Viet" typeface="Arial"/>
+        <a:font script="Uigh" typeface="Microsoft Uighur"/>
+        <a:font script="Geor" typeface="Sylfaen"/>
+        <a:font script="Armn" typeface="Arial"/>
+        <a:font script="Bugi" typeface="Leelawadee UI"/>
+        <a:font script="Bopo" typeface="Microsoft JhengHei"/>
+        <a:font script="Java" typeface="Javanese Text"/>
+        <a:font script="Lisu" typeface="Segoe UI"/>
+        <a:font script="Mymr" typeface="Myanmar Text"/>
+        <a:font script="Nkoo" typeface="Ebrima"/>
+        <a:font script="Olck" typeface="Nirmala UI"/>
+        <a:font script="Osma" typeface="Ebrima"/>
+        <a:font script="Phag" typeface="Phagspa"/>
+        <a:font script="Syrn" typeface="Estrangelo Edessa"/>
+        <a:font script="Syrj" typeface="Estrangelo Edessa"/>
+        <a:font script="Syre" typeface="Estrangelo Edessa"/>
+        <a:font script="Sora" typeface="Nirmala UI"/>
+        <a:font script="Tale" typeface="Microsoft Tai Le"/>
+        <a:font script="Talu" typeface="Microsoft New Tai Lue"/>
+        <a:font script="Tfng" typeface="Ebrima"/>
       </a:minorFont>
     </a:fontScheme>
     <a:fmtScheme name="Office">

</xml_diff>

<commit_message>
updated slides for IR and SSA1
</commit_message>
<xml_diff>
--- a/assets/ppt/codegen/ssaform1.pptx
+++ b/assets/ppt/codegen/ssaform1.pptx
@@ -253,7 +253,7 @@
                 <a:latin typeface="Calibri" panose="020F0502020204030204" pitchFamily="34" charset="0"/>
               </a:rPr>
               <a:pPr/>
-              <a:t>10/31/20</a:t>
+              <a:t>11/1/20</a:t>
             </a:fld>
             <a:endParaRPr lang="en-US" dirty="0">
               <a:latin typeface="Calibri" panose="020F0502020204030204" pitchFamily="34" charset="0"/>
@@ -1551,7 +1551,7 @@
           <a:p>
             <a:fld id="{37508BEE-B66E-5E46-B50F-23B30D56323F}" type="datetime1">
               <a:rPr lang="en-CA" smtClean="0"/>
-              <a:t>2020-10-31</a:t>
+              <a:t>2020-11-01</a:t>
             </a:fld>
             <a:endParaRPr lang="en-US"/>
           </a:p>
@@ -1749,7 +1749,7 @@
           <a:p>
             <a:fld id="{94ED5F46-E862-7041-B839-1084A839C514}" type="datetime1">
               <a:rPr lang="en-CA" smtClean="0"/>
-              <a:t>2020-10-31</a:t>
+              <a:t>2020-11-01</a:t>
             </a:fld>
             <a:endParaRPr lang="en-US"/>
           </a:p>
@@ -1957,7 +1957,7 @@
           <a:p>
             <a:fld id="{A0755934-2EEA-454B-B47B-39481B16D93C}" type="datetime1">
               <a:rPr lang="en-CA" smtClean="0"/>
-              <a:t>2020-10-31</a:t>
+              <a:t>2020-11-01</a:t>
             </a:fld>
             <a:endParaRPr lang="en-US"/>
           </a:p>
@@ -3020,7 +3020,7 @@
           <a:p>
             <a:fld id="{33CDF6D5-475A-F046-87CA-412EB71D7141}" type="datetime1">
               <a:rPr lang="en-CA" smtClean="0"/>
-              <a:t>2020-10-31</a:t>
+              <a:t>2020-11-01</a:t>
             </a:fld>
             <a:endParaRPr/>
           </a:p>
@@ -3436,7 +3436,7 @@
           <a:p>
             <a:fld id="{BD806BE7-D4FF-0747-A46D-9D28D6793F9A}" type="datetime1">
               <a:rPr lang="en-CA" smtClean="0"/>
-              <a:t>2020-10-31</a:t>
+              <a:t>2020-11-01</a:t>
             </a:fld>
             <a:endParaRPr lang="en-US"/>
           </a:p>
@@ -3711,7 +3711,7 @@
           <a:p>
             <a:fld id="{FC112D8A-ADE8-E648-9A51-673455F77FA4}" type="datetime1">
               <a:rPr lang="en-CA" smtClean="0"/>
-              <a:t>2020-10-31</a:t>
+              <a:t>2020-11-01</a:t>
             </a:fld>
             <a:endParaRPr lang="en-US"/>
           </a:p>
@@ -3976,7 +3976,7 @@
           <a:p>
             <a:fld id="{A1C4D21D-FE66-404B-9D48-8813A41FDE83}" type="datetime1">
               <a:rPr lang="en-CA" smtClean="0"/>
-              <a:t>2020-10-31</a:t>
+              <a:t>2020-11-01</a:t>
             </a:fld>
             <a:endParaRPr lang="en-US"/>
           </a:p>
@@ -4388,7 +4388,7 @@
           <a:p>
             <a:fld id="{BC43913A-9187-9E4F-99AD-E5F9D3D715A1}" type="datetime1">
               <a:rPr lang="en-CA" smtClean="0"/>
-              <a:t>2020-10-31</a:t>
+              <a:t>2020-11-01</a:t>
             </a:fld>
             <a:endParaRPr lang="en-US"/>
           </a:p>
@@ -4529,7 +4529,7 @@
           <a:p>
             <a:fld id="{D640FCF0-750B-2849-A907-F64332DB8FEE}" type="datetime1">
               <a:rPr lang="en-CA" smtClean="0"/>
-              <a:t>2020-10-31</a:t>
+              <a:t>2020-11-01</a:t>
             </a:fld>
             <a:endParaRPr lang="en-US"/>
           </a:p>
@@ -4642,7 +4642,7 @@
           <a:p>
             <a:fld id="{C84DF663-3970-9B45-8274-AA8FABDA274B}" type="datetime1">
               <a:rPr lang="en-CA" smtClean="0"/>
-              <a:t>2020-10-31</a:t>
+              <a:t>2020-11-01</a:t>
             </a:fld>
             <a:endParaRPr lang="en-US"/>
           </a:p>
@@ -4953,7 +4953,7 @@
           <a:p>
             <a:fld id="{2EE809A3-0E53-524E-A233-B12C5DA91D99}" type="datetime1">
               <a:rPr lang="en-CA" smtClean="0"/>
-              <a:t>2020-10-31</a:t>
+              <a:t>2020-11-01</a:t>
             </a:fld>
             <a:endParaRPr lang="en-US"/>
           </a:p>
@@ -5241,7 +5241,7 @@
           <a:p>
             <a:fld id="{CBAFDF68-DD51-514E-B179-E22080947065}" type="datetime1">
               <a:rPr lang="en-CA" smtClean="0"/>
-              <a:t>2020-10-31</a:t>
+              <a:t>2020-11-01</a:t>
             </a:fld>
             <a:endParaRPr lang="en-US"/>
           </a:p>
@@ -5483,7 +5483,7 @@
           <a:p>
             <a:fld id="{CFB5B512-1C0B-5F4A-B1D8-07EED328189A}" type="datetime1">
               <a:rPr lang="en-CA" smtClean="0"/>
-              <a:t>2020-10-31</a:t>
+              <a:t>2020-11-01</a:t>
             </a:fld>
             <a:endParaRPr lang="en-US" dirty="0"/>
           </a:p>
@@ -6087,8 +6087,8 @@
         </p:nvSpPr>
         <p:spPr>
           <a:xfrm>
-            <a:off x="7164288" y="267494"/>
-            <a:ext cx="1714907" cy="383175"/>
+            <a:off x="6948264" y="267494"/>
+            <a:ext cx="1930931" cy="383175"/>
           </a:xfrm>
           <a:prstGeom prst="roundRect">
             <a:avLst>
@@ -6136,7 +6136,7 @@
                 <a:cs typeface="Calibri"/>
                 <a:sym typeface="Calibri"/>
               </a:rPr>
-              <a:t>SSA Form 1</a:t>
+              <a:t>SSA1: Intro to SSA</a:t>
             </a:r>
           </a:p>
         </p:txBody>
@@ -7545,7 +7545,7 @@
           <p:spPr bwMode="auto">
             <a:xfrm>
               <a:off x="3456" y="2016"/>
-              <a:ext cx="2064" cy="1776"/>
+              <a:ext cx="2064" cy="1576"/>
             </a:xfrm>
             <a:prstGeom prst="rect">
               <a:avLst/>
@@ -7631,23 +7631,7 @@
                 <a:rPr lang="en-US" sz="1200" dirty="0">
                   <a:latin typeface="Calibri" panose="020F0502020204030204" pitchFamily="34" charset="0"/>
                 </a:rPr>
-                <a:t>    param i </a:t>
-              </a:r>
-            </a:p>
-            <a:p>
-              <a:pPr eaLnBrk="1" hangingPunct="1">
-                <a:lnSpc>
-                  <a:spcPct val="90000"/>
-                </a:lnSpc>
-                <a:spcBef>
-                  <a:spcPct val="20000"/>
-                </a:spcBef>
-              </a:pPr>
-              <a:r>
-                <a:rPr lang="en-US" sz="1200" dirty="0">
-                  <a:latin typeface="Calibri" panose="020F0502020204030204" pitchFamily="34" charset="0"/>
-                </a:rPr>
-                <a:t>    t6 = call f, 1</a:t>
+                <a:t>    t6 = call f(i)</a:t>
               </a:r>
             </a:p>
             <a:p>
@@ -7910,8 +7894,8 @@
           </p:nvCxnSpPr>
           <p:spPr bwMode="auto">
             <a:xfrm>
-              <a:off x="4488" y="1926"/>
-              <a:ext cx="0" cy="84"/>
+              <a:off x="4488" y="1920"/>
+              <a:ext cx="0" cy="96"/>
             </a:xfrm>
             <a:prstGeom prst="straightConnector1">
               <a:avLst/>
@@ -7939,15 +7923,15 @@
             <p:nvPr/>
           </p:nvCxnSpPr>
           <p:spPr bwMode="auto">
-            <a:xfrm rot="5400000" flipH="1" flipV="1">
-              <a:off x="3187" y="2495"/>
-              <a:ext cx="2604" cy="1"/>
+            <a:xfrm rot="5400000" flipH="1">
+              <a:off x="3292" y="2396"/>
+              <a:ext cx="2392" cy="11"/>
             </a:xfrm>
             <a:prstGeom prst="bentConnector5">
               <a:avLst>
-                <a:gd name="adj1" fmla="val -1194"/>
-                <a:gd name="adj2" fmla="val 117600000"/>
-                <a:gd name="adj3" fmla="val 105301"/>
+                <a:gd name="adj1" fmla="val -8027"/>
+                <a:gd name="adj2" fmla="val 11475000"/>
+                <a:gd name="adj3" fmla="val 108027"/>
               </a:avLst>
             </a:prstGeom>
             <a:noFill/>
@@ -8093,7 +8077,7 @@
         </p:nvSpPr>
         <p:spPr bwMode="auto">
           <a:xfrm>
-            <a:off x="6220223" y="3519314"/>
+            <a:off x="6220223" y="3459544"/>
             <a:ext cx="912622" cy="369332"/>
           </a:xfrm>
           <a:prstGeom prst="rect">
@@ -8138,7 +8122,7 @@
         </p:nvSpPr>
         <p:spPr bwMode="auto">
           <a:xfrm>
-            <a:off x="6220223" y="4490864"/>
+            <a:off x="6220223" y="4251466"/>
             <a:ext cx="447558" cy="369332"/>
           </a:xfrm>
           <a:prstGeom prst="rect">

</xml_diff>

<commit_message>
updated ssa slides; quiz4 date change
</commit_message>
<xml_diff>
--- a/assets/ppt/codegen/ssaform1.pptx
+++ b/assets/ppt/codegen/ssaform1.pptx
@@ -253,7 +253,7 @@
                 <a:latin typeface="Calibri" panose="020F0502020204030204" pitchFamily="34" charset="0"/>
               </a:rPr>
               <a:pPr/>
-              <a:t>11/1/20</a:t>
+              <a:t>11/8/20</a:t>
             </a:fld>
             <a:endParaRPr lang="en-US" dirty="0">
               <a:latin typeface="Calibri" panose="020F0502020204030204" pitchFamily="34" charset="0"/>
@@ -1551,7 +1551,7 @@
           <a:p>
             <a:fld id="{37508BEE-B66E-5E46-B50F-23B30D56323F}" type="datetime1">
               <a:rPr lang="en-CA" smtClean="0"/>
-              <a:t>2020-11-01</a:t>
+              <a:t>2020-11-08</a:t>
             </a:fld>
             <a:endParaRPr lang="en-US"/>
           </a:p>
@@ -1749,7 +1749,7 @@
           <a:p>
             <a:fld id="{94ED5F46-E862-7041-B839-1084A839C514}" type="datetime1">
               <a:rPr lang="en-CA" smtClean="0"/>
-              <a:t>2020-11-01</a:t>
+              <a:t>2020-11-08</a:t>
             </a:fld>
             <a:endParaRPr lang="en-US"/>
           </a:p>
@@ -1957,7 +1957,7 @@
           <a:p>
             <a:fld id="{A0755934-2EEA-454B-B47B-39481B16D93C}" type="datetime1">
               <a:rPr lang="en-CA" smtClean="0"/>
-              <a:t>2020-11-01</a:t>
+              <a:t>2020-11-08</a:t>
             </a:fld>
             <a:endParaRPr lang="en-US"/>
           </a:p>
@@ -3020,7 +3020,7 @@
           <a:p>
             <a:fld id="{33CDF6D5-475A-F046-87CA-412EB71D7141}" type="datetime1">
               <a:rPr lang="en-CA" smtClean="0"/>
-              <a:t>2020-11-01</a:t>
+              <a:t>2020-11-08</a:t>
             </a:fld>
             <a:endParaRPr/>
           </a:p>
@@ -3436,7 +3436,7 @@
           <a:p>
             <a:fld id="{BD806BE7-D4FF-0747-A46D-9D28D6793F9A}" type="datetime1">
               <a:rPr lang="en-CA" smtClean="0"/>
-              <a:t>2020-11-01</a:t>
+              <a:t>2020-11-08</a:t>
             </a:fld>
             <a:endParaRPr lang="en-US"/>
           </a:p>
@@ -3711,7 +3711,7 @@
           <a:p>
             <a:fld id="{FC112D8A-ADE8-E648-9A51-673455F77FA4}" type="datetime1">
               <a:rPr lang="en-CA" smtClean="0"/>
-              <a:t>2020-11-01</a:t>
+              <a:t>2020-11-08</a:t>
             </a:fld>
             <a:endParaRPr lang="en-US"/>
           </a:p>
@@ -3976,7 +3976,7 @@
           <a:p>
             <a:fld id="{A1C4D21D-FE66-404B-9D48-8813A41FDE83}" type="datetime1">
               <a:rPr lang="en-CA" smtClean="0"/>
-              <a:t>2020-11-01</a:t>
+              <a:t>2020-11-08</a:t>
             </a:fld>
             <a:endParaRPr lang="en-US"/>
           </a:p>
@@ -4388,7 +4388,7 @@
           <a:p>
             <a:fld id="{BC43913A-9187-9E4F-99AD-E5F9D3D715A1}" type="datetime1">
               <a:rPr lang="en-CA" smtClean="0"/>
-              <a:t>2020-11-01</a:t>
+              <a:t>2020-11-08</a:t>
             </a:fld>
             <a:endParaRPr lang="en-US"/>
           </a:p>
@@ -4529,7 +4529,7 @@
           <a:p>
             <a:fld id="{D640FCF0-750B-2849-A907-F64332DB8FEE}" type="datetime1">
               <a:rPr lang="en-CA" smtClean="0"/>
-              <a:t>2020-11-01</a:t>
+              <a:t>2020-11-08</a:t>
             </a:fld>
             <a:endParaRPr lang="en-US"/>
           </a:p>
@@ -4642,7 +4642,7 @@
           <a:p>
             <a:fld id="{C84DF663-3970-9B45-8274-AA8FABDA274B}" type="datetime1">
               <a:rPr lang="en-CA" smtClean="0"/>
-              <a:t>2020-11-01</a:t>
+              <a:t>2020-11-08</a:t>
             </a:fld>
             <a:endParaRPr lang="en-US"/>
           </a:p>
@@ -4953,7 +4953,7 @@
           <a:p>
             <a:fld id="{2EE809A3-0E53-524E-A233-B12C5DA91D99}" type="datetime1">
               <a:rPr lang="en-CA" smtClean="0"/>
-              <a:t>2020-11-01</a:t>
+              <a:t>2020-11-08</a:t>
             </a:fld>
             <a:endParaRPr lang="en-US"/>
           </a:p>
@@ -5241,7 +5241,7 @@
           <a:p>
             <a:fld id="{CBAFDF68-DD51-514E-B179-E22080947065}" type="datetime1">
               <a:rPr lang="en-CA" smtClean="0"/>
-              <a:t>2020-11-01</a:t>
+              <a:t>2020-11-08</a:t>
             </a:fld>
             <a:endParaRPr lang="en-US"/>
           </a:p>
@@ -5483,7 +5483,7 @@
           <a:p>
             <a:fld id="{CFB5B512-1C0B-5F4A-B1D8-07EED328189A}" type="datetime1">
               <a:rPr lang="en-CA" smtClean="0"/>
-              <a:t>2020-11-01</a:t>
+              <a:t>2020-11-08</a:t>
             </a:fld>
             <a:endParaRPr lang="en-US" dirty="0"/>
           </a:p>

</xml_diff>